<commit_message>
rectangle is now filled with color + some fixes
</commit_message>
<xml_diff>
--- a/doc/turned rectangle/rotated_rect.pptx
+++ b/doc/turned rectangle/rotated_rect.pptx
@@ -7,10 +7,9 @@
   <p:sldIdLst>
     <p:sldId id="256" r:id="rId2"/>
     <p:sldId id="257" r:id="rId3"/>
-    <p:sldId id="258" r:id="rId4"/>
-    <p:sldId id="260" r:id="rId5"/>
-    <p:sldId id="262" r:id="rId6"/>
-    <p:sldId id="261" r:id="rId7"/>
+    <p:sldId id="260" r:id="rId4"/>
+    <p:sldId id="262" r:id="rId5"/>
+    <p:sldId id="263" r:id="rId6"/>
   </p:sldIdLst>
   <p:sldSz cx="12192000" cy="6858000"/>
   <p:notesSz cx="6858000" cy="9144000"/>
@@ -4359,10 +4358,10 @@
         </p:nvGrpSpPr>
         <p:grpSpPr>
           <a:xfrm rot="926603">
-            <a:off x="1972832" y="838746"/>
-            <a:ext cx="7380178" cy="5296599"/>
-            <a:chOff x="1954322" y="890809"/>
-            <a:chExt cx="7380178" cy="5296599"/>
+            <a:off x="1873005" y="825214"/>
+            <a:ext cx="7481838" cy="5296599"/>
+            <a:chOff x="1852662" y="890809"/>
+            <a:chExt cx="7481838" cy="5296599"/>
           </a:xfrm>
         </p:grpSpPr>
         <p:grpSp>
@@ -4630,8 +4629,8 @@
           </p:nvCxnSpPr>
           <p:spPr>
             <a:xfrm rot="20673397" flipV="1">
-              <a:off x="1954322" y="2188713"/>
-              <a:ext cx="6869823" cy="3579002"/>
+              <a:off x="1852662" y="2220435"/>
+              <a:ext cx="6830001" cy="3485806"/>
             </a:xfrm>
             <a:prstGeom prst="line">
               <a:avLst/>
@@ -4707,8 +4706,8 @@
             </a:p>
           </p:txBody>
         </p:sp>
-        <mc:AlternateContent xmlns:mc="http://schemas.openxmlformats.org/markup-compatibility/2006" xmlns:a14="http://schemas.microsoft.com/office/drawing/2010/main">
-          <mc:Choice Requires="a14">
+        <mc:AlternateContent xmlns:mc="http://schemas.openxmlformats.org/markup-compatibility/2006">
+          <mc:Choice xmlns:a14="http://schemas.microsoft.com/office/drawing/2010/main" Requires="a14">
             <p:sp>
               <p:nvSpPr>
                 <p:cNvPr id="29" name="TextBox 28">
@@ -4723,7 +4722,7 @@
               </p:nvSpPr>
               <p:spPr>
                 <a:xfrm>
-                  <a:off x="6305930" y="2855941"/>
+                  <a:off x="6280488" y="2833928"/>
                   <a:ext cx="531844" cy="369332"/>
                 </a:xfrm>
                 <a:prstGeom prst="rect">
@@ -4758,7 +4757,7 @@
               </p:txBody>
             </p:sp>
           </mc:Choice>
-          <mc:Fallback xmlns="">
+          <mc:Fallback>
             <p:sp>
               <p:nvSpPr>
                 <p:cNvPr id="29" name="TextBox 28">
@@ -4775,7 +4774,7 @@
               </p:nvSpPr>
               <p:spPr>
                 <a:xfrm>
-                  <a:off x="6305930" y="2855941"/>
+                  <a:off x="6280488" y="2833928"/>
                   <a:ext cx="531844" cy="369332"/>
                 </a:xfrm>
                 <a:prstGeom prst="rect">
@@ -4817,7 +4816,7 @@
           </p:nvSpPr>
           <p:spPr>
             <a:xfrm>
-              <a:off x="6202983" y="2852629"/>
+              <a:off x="6161092" y="2806121"/>
               <a:ext cx="612307" cy="814957"/>
             </a:xfrm>
             <a:prstGeom prst="arc">
@@ -4851,12 +4850,12 @@
             <a:lstStyle/>
             <a:p>
               <a:pPr algn="ctr"/>
-              <a:endParaRPr lang="de-DE"/>
+              <a:endParaRPr lang="de-DE" dirty="0"/>
             </a:p>
           </p:txBody>
         </p:sp>
-        <mc:AlternateContent xmlns:mc="http://schemas.openxmlformats.org/markup-compatibility/2006" xmlns:a14="http://schemas.microsoft.com/office/drawing/2010/main">
-          <mc:Choice Requires="a14">
+        <mc:AlternateContent xmlns:mc="http://schemas.openxmlformats.org/markup-compatibility/2006">
+          <mc:Choice xmlns:a14="http://schemas.microsoft.com/office/drawing/2010/main" Requires="a14">
             <p:sp>
               <p:nvSpPr>
                 <p:cNvPr id="31" name="TextBox 30">
@@ -4871,7 +4870,7 @@
               </p:nvSpPr>
               <p:spPr>
                 <a:xfrm>
-                  <a:off x="5988386" y="2777960"/>
+                  <a:off x="5945098" y="2691390"/>
                   <a:ext cx="264175" cy="369332"/>
                 </a:xfrm>
                 <a:prstGeom prst="rect">
@@ -4906,7 +4905,7 @@
               </p:txBody>
             </p:sp>
           </mc:Choice>
-          <mc:Fallback xmlns="">
+          <mc:Fallback>
             <p:sp>
               <p:nvSpPr>
                 <p:cNvPr id="31" name="TextBox 30">
@@ -4923,7 +4922,7 @@
               </p:nvSpPr>
               <p:spPr>
                 <a:xfrm>
-                  <a:off x="5988386" y="2777960"/>
+                  <a:off x="5945098" y="2691390"/>
                   <a:ext cx="264175" cy="369332"/>
                 </a:xfrm>
                 <a:prstGeom prst="rect">
@@ -4932,7 +4931,7 @@
                 <a:blipFill>
                   <a:blip r:embed="rId3"/>
                   <a:stretch>
-                    <a:fillRect l="-37288" t="-5634" r="-25424" b="-33803"/>
+                    <a:fillRect l="-37288" t="-5634" r="-25424" b="-32394"/>
                   </a:stretch>
                 </a:blipFill>
               </p:spPr>
@@ -5129,7 +5128,7 @@
         </p:nvCxnSpPr>
         <p:spPr>
           <a:xfrm flipV="1">
-            <a:off x="7196814" y="2181638"/>
+            <a:off x="7178152" y="2162976"/>
             <a:ext cx="1237172" cy="632296"/>
           </a:xfrm>
           <a:prstGeom prst="line">
@@ -5503,7 +5502,7 @@
         </p:nvCxnSpPr>
         <p:spPr>
           <a:xfrm flipV="1">
-            <a:off x="6867524" y="2645585"/>
+            <a:off x="6848862" y="2626923"/>
             <a:ext cx="178668" cy="115136"/>
           </a:xfrm>
           <a:prstGeom prst="line">
@@ -5546,7 +5545,7 @@
         </p:nvCxnSpPr>
         <p:spPr>
           <a:xfrm flipH="1" flipV="1">
-            <a:off x="6874171" y="2745666"/>
+            <a:off x="6855509" y="2727004"/>
             <a:ext cx="102830" cy="173315"/>
           </a:xfrm>
           <a:prstGeom prst="line">
@@ -5706,1804 +5705,6 @@
 </file>
 
 <file path=ppt/slides/slide3.xml><?xml version="1.0" encoding="utf-8"?>
-<p:sld xmlns:a="http://schemas.openxmlformats.org/drawingml/2006/main" xmlns:r="http://schemas.openxmlformats.org/officeDocument/2006/relationships" xmlns:p="http://schemas.openxmlformats.org/presentationml/2006/main">
-  <p:cSld>
-    <p:spTree>
-      <p:nvGrpSpPr>
-        <p:cNvPr id="1" name=""/>
-        <p:cNvGrpSpPr/>
-        <p:nvPr/>
-      </p:nvGrpSpPr>
-      <p:grpSpPr>
-        <a:xfrm>
-          <a:off x="0" y="0"/>
-          <a:ext cx="0" cy="0"/>
-          <a:chOff x="0" y="0"/>
-          <a:chExt cx="0" cy="0"/>
-        </a:xfrm>
-      </p:grpSpPr>
-      <p:grpSp>
-        <p:nvGrpSpPr>
-          <p:cNvPr id="9" name="Group 8">
-            <a:extLst>
-              <a:ext uri="{FF2B5EF4-FFF2-40B4-BE49-F238E27FC236}">
-                <a16:creationId xmlns:a16="http://schemas.microsoft.com/office/drawing/2014/main" id="{2A1BC5CB-0BD7-4EB9-9704-C92742D3B5AA}"/>
-              </a:ext>
-            </a:extLst>
-          </p:cNvPr>
-          <p:cNvGrpSpPr/>
-          <p:nvPr/>
-        </p:nvGrpSpPr>
-        <p:grpSpPr>
-          <a:xfrm>
-            <a:off x="45874" y="-165916"/>
-            <a:ext cx="12146126" cy="6912156"/>
-            <a:chOff x="45874" y="-54156"/>
-            <a:chExt cx="12146126" cy="6846842"/>
-          </a:xfrm>
-        </p:grpSpPr>
-        <p:cxnSp>
-          <p:nvCxnSpPr>
-            <p:cNvPr id="10" name="Straight Arrow Connector 9">
-              <a:extLst>
-                <a:ext uri="{FF2B5EF4-FFF2-40B4-BE49-F238E27FC236}">
-                  <a16:creationId xmlns:a16="http://schemas.microsoft.com/office/drawing/2014/main" id="{A856F091-7D55-4E08-B3A8-42D4E07BE9A7}"/>
-                </a:ext>
-              </a:extLst>
-            </p:cNvPr>
-            <p:cNvCxnSpPr>
-              <a:cxnSpLocks/>
-            </p:cNvCxnSpPr>
-            <p:nvPr/>
-          </p:nvCxnSpPr>
-          <p:spPr>
-            <a:xfrm flipV="1">
-              <a:off x="45874" y="3441131"/>
-              <a:ext cx="12146126" cy="37025"/>
-            </a:xfrm>
-            <a:prstGeom prst="straightConnector1">
-              <a:avLst/>
-            </a:prstGeom>
-            <a:ln w="76200">
-              <a:solidFill>
-                <a:schemeClr val="tx1"/>
-              </a:solidFill>
-              <a:headEnd type="triangle"/>
-              <a:tailEnd type="triangle"/>
-            </a:ln>
-          </p:spPr>
-          <p:style>
-            <a:lnRef idx="1">
-              <a:schemeClr val="accent1"/>
-            </a:lnRef>
-            <a:fillRef idx="0">
-              <a:schemeClr val="accent1"/>
-            </a:fillRef>
-            <a:effectRef idx="0">
-              <a:schemeClr val="accent1"/>
-            </a:effectRef>
-            <a:fontRef idx="minor">
-              <a:schemeClr val="tx1"/>
-            </a:fontRef>
-          </p:style>
-        </p:cxnSp>
-        <p:cxnSp>
-          <p:nvCxnSpPr>
-            <p:cNvPr id="11" name="Straight Arrow Connector 10">
-              <a:extLst>
-                <a:ext uri="{FF2B5EF4-FFF2-40B4-BE49-F238E27FC236}">
-                  <a16:creationId xmlns:a16="http://schemas.microsoft.com/office/drawing/2014/main" id="{7A796DEF-E20F-44F8-98CA-8028FF69C166}"/>
-                </a:ext>
-              </a:extLst>
-            </p:cNvPr>
-            <p:cNvCxnSpPr>
-              <a:cxnSpLocks/>
-            </p:cNvCxnSpPr>
-            <p:nvPr/>
-          </p:nvCxnSpPr>
-          <p:spPr>
-            <a:xfrm flipV="1">
-              <a:off x="5966387" y="1"/>
-              <a:ext cx="0" cy="6792685"/>
-            </a:xfrm>
-            <a:prstGeom prst="straightConnector1">
-              <a:avLst/>
-            </a:prstGeom>
-            <a:ln w="76200">
-              <a:solidFill>
-                <a:schemeClr val="tx1"/>
-              </a:solidFill>
-              <a:headEnd type="triangle"/>
-              <a:tailEnd type="triangle"/>
-            </a:ln>
-          </p:spPr>
-          <p:style>
-            <a:lnRef idx="1">
-              <a:schemeClr val="accent1"/>
-            </a:lnRef>
-            <a:fillRef idx="0">
-              <a:schemeClr val="accent1"/>
-            </a:fillRef>
-            <a:effectRef idx="0">
-              <a:schemeClr val="accent1"/>
-            </a:effectRef>
-            <a:fontRef idx="minor">
-              <a:schemeClr val="tx1"/>
-            </a:fontRef>
-          </p:style>
-        </p:cxnSp>
-        <p:sp>
-          <p:nvSpPr>
-            <p:cNvPr id="12" name="TextBox 11">
-              <a:extLst>
-                <a:ext uri="{FF2B5EF4-FFF2-40B4-BE49-F238E27FC236}">
-                  <a16:creationId xmlns:a16="http://schemas.microsoft.com/office/drawing/2014/main" id="{481FC39E-2DE9-4F0C-93B7-BD047BD5A46B}"/>
-                </a:ext>
-              </a:extLst>
-            </p:cNvPr>
-            <p:cNvSpPr txBox="1"/>
-            <p:nvPr/>
-          </p:nvSpPr>
-          <p:spPr>
-            <a:xfrm>
-              <a:off x="6096000" y="-54156"/>
-              <a:ext cx="356118" cy="369332"/>
-            </a:xfrm>
-            <a:prstGeom prst="rect">
-              <a:avLst/>
-            </a:prstGeom>
-            <a:noFill/>
-          </p:spPr>
-          <p:txBody>
-            <a:bodyPr wrap="square" rtlCol="0">
-              <a:spAutoFit/>
-            </a:bodyPr>
-            <a:lstStyle/>
-            <a:p>
-              <a:r>
-                <a:rPr lang="en-US" dirty="0"/>
-                <a:t>y</a:t>
-              </a:r>
-              <a:endParaRPr lang="de-DE" dirty="0"/>
-            </a:p>
-          </p:txBody>
-        </p:sp>
-        <p:sp>
-          <p:nvSpPr>
-            <p:cNvPr id="13" name="TextBox 12">
-              <a:extLst>
-                <a:ext uri="{FF2B5EF4-FFF2-40B4-BE49-F238E27FC236}">
-                  <a16:creationId xmlns:a16="http://schemas.microsoft.com/office/drawing/2014/main" id="{730D801F-F63F-465F-B683-C6FFD2D9FDD2}"/>
-                </a:ext>
-              </a:extLst>
-            </p:cNvPr>
-            <p:cNvSpPr txBox="1"/>
-            <p:nvPr/>
-          </p:nvSpPr>
-          <p:spPr>
-            <a:xfrm>
-              <a:off x="11790009" y="2944687"/>
-              <a:ext cx="356118" cy="369332"/>
-            </a:xfrm>
-            <a:prstGeom prst="rect">
-              <a:avLst/>
-            </a:prstGeom>
-            <a:noFill/>
-          </p:spPr>
-          <p:txBody>
-            <a:bodyPr wrap="square" rtlCol="0">
-              <a:spAutoFit/>
-            </a:bodyPr>
-            <a:lstStyle/>
-            <a:p>
-              <a:r>
-                <a:rPr lang="en-US" dirty="0"/>
-                <a:t>x</a:t>
-              </a:r>
-              <a:endParaRPr lang="de-DE" dirty="0"/>
-            </a:p>
-          </p:txBody>
-        </p:sp>
-      </p:grpSp>
-      <p:grpSp>
-        <p:nvGrpSpPr>
-          <p:cNvPr id="46" name="Group 45">
-            <a:extLst>
-              <a:ext uri="{FF2B5EF4-FFF2-40B4-BE49-F238E27FC236}">
-                <a16:creationId xmlns:a16="http://schemas.microsoft.com/office/drawing/2014/main" id="{B39E93FB-D7E8-4A74-ACF2-85A4B4413AAC}"/>
-              </a:ext>
-            </a:extLst>
-          </p:cNvPr>
-          <p:cNvGrpSpPr/>
-          <p:nvPr/>
-        </p:nvGrpSpPr>
-        <p:grpSpPr>
-          <a:xfrm rot="926603">
-            <a:off x="1947363" y="886921"/>
-            <a:ext cx="7779871" cy="5296599"/>
-            <a:chOff x="1935384" y="890809"/>
-            <a:chExt cx="7779871" cy="5296599"/>
-          </a:xfrm>
-        </p:grpSpPr>
-        <p:grpSp>
-          <p:nvGrpSpPr>
-            <p:cNvPr id="17" name="Group 16">
-              <a:extLst>
-                <a:ext uri="{FF2B5EF4-FFF2-40B4-BE49-F238E27FC236}">
-                  <a16:creationId xmlns:a16="http://schemas.microsoft.com/office/drawing/2014/main" id="{F45BC917-8775-4590-A1D0-0F33D1AFD859}"/>
-                </a:ext>
-              </a:extLst>
-            </p:cNvPr>
-            <p:cNvGrpSpPr/>
-            <p:nvPr/>
-          </p:nvGrpSpPr>
-          <p:grpSpPr>
-            <a:xfrm>
-              <a:off x="3320661" y="890809"/>
-              <a:ext cx="5109903" cy="5296599"/>
-              <a:chOff x="2817844" y="609439"/>
-              <a:chExt cx="5109903" cy="5296599"/>
-            </a:xfrm>
-          </p:grpSpPr>
-          <p:sp>
-            <p:nvSpPr>
-              <p:cNvPr id="18" name="Rectangle 17">
-                <a:extLst>
-                  <a:ext uri="{FF2B5EF4-FFF2-40B4-BE49-F238E27FC236}">
-                    <a16:creationId xmlns:a16="http://schemas.microsoft.com/office/drawing/2014/main" id="{4E8AE796-9C27-44B1-90EC-EA774FD44A86}"/>
-                  </a:ext>
-                </a:extLst>
-              </p:cNvPr>
-              <p:cNvSpPr/>
-              <p:nvPr/>
-            </p:nvSpPr>
-            <p:spPr>
-              <a:xfrm rot="13635441">
-                <a:off x="3676262" y="1847460"/>
-                <a:ext cx="3610947" cy="2679539"/>
-              </a:xfrm>
-              <a:prstGeom prst="rect">
-                <a:avLst/>
-              </a:prstGeom>
-              <a:noFill/>
-              <a:ln w="76200"/>
-            </p:spPr>
-            <p:style>
-              <a:lnRef idx="2">
-                <a:schemeClr val="accent1">
-                  <a:shade val="50000"/>
-                </a:schemeClr>
-              </a:lnRef>
-              <a:fillRef idx="1">
-                <a:schemeClr val="accent1"/>
-              </a:fillRef>
-              <a:effectRef idx="0">
-                <a:schemeClr val="accent1"/>
-              </a:effectRef>
-              <a:fontRef idx="minor">
-                <a:schemeClr val="lt1"/>
-              </a:fontRef>
-            </p:style>
-            <p:txBody>
-              <a:bodyPr rtlCol="0" anchor="ctr"/>
-              <a:lstStyle/>
-              <a:p>
-                <a:pPr algn="ctr"/>
-                <a:endParaRPr lang="de-DE"/>
-              </a:p>
-            </p:txBody>
-          </p:sp>
-          <p:sp>
-            <p:nvSpPr>
-              <p:cNvPr id="19" name="TextBox 18">
-                <a:extLst>
-                  <a:ext uri="{FF2B5EF4-FFF2-40B4-BE49-F238E27FC236}">
-                    <a16:creationId xmlns:a16="http://schemas.microsoft.com/office/drawing/2014/main" id="{51D3EC23-BAC8-458C-B0A3-AB6E3D638638}"/>
-                  </a:ext>
-                </a:extLst>
-              </p:cNvPr>
-              <p:cNvSpPr txBox="1"/>
-              <p:nvPr/>
-            </p:nvSpPr>
-            <p:spPr>
-              <a:xfrm>
-                <a:off x="5077129" y="609439"/>
-                <a:ext cx="585606" cy="369332"/>
-              </a:xfrm>
-              <a:prstGeom prst="rect">
-                <a:avLst/>
-              </a:prstGeom>
-              <a:noFill/>
-            </p:spPr>
-            <p:txBody>
-              <a:bodyPr wrap="square" rtlCol="0">
-                <a:spAutoFit/>
-              </a:bodyPr>
-              <a:lstStyle/>
-              <a:p>
-                <a:r>
-                  <a:rPr lang="en-US" dirty="0"/>
-                  <a:t>A</a:t>
-                </a:r>
-                <a:endParaRPr lang="de-DE" dirty="0"/>
-              </a:p>
-            </p:txBody>
-          </p:sp>
-          <p:sp>
-            <p:nvSpPr>
-              <p:cNvPr id="20" name="TextBox 19">
-                <a:extLst>
-                  <a:ext uri="{FF2B5EF4-FFF2-40B4-BE49-F238E27FC236}">
-                    <a16:creationId xmlns:a16="http://schemas.microsoft.com/office/drawing/2014/main" id="{88DA1610-CAFD-4B0C-8B9A-35111331AFCC}"/>
-                  </a:ext>
-                </a:extLst>
-              </p:cNvPr>
-              <p:cNvSpPr txBox="1"/>
-              <p:nvPr/>
-            </p:nvSpPr>
-            <p:spPr>
-              <a:xfrm>
-                <a:off x="7563853" y="3186166"/>
-                <a:ext cx="363894" cy="369332"/>
-              </a:xfrm>
-              <a:prstGeom prst="rect">
-                <a:avLst/>
-              </a:prstGeom>
-              <a:noFill/>
-            </p:spPr>
-            <p:txBody>
-              <a:bodyPr wrap="square" rtlCol="0">
-                <a:spAutoFit/>
-              </a:bodyPr>
-              <a:lstStyle/>
-              <a:p>
-                <a:r>
-                  <a:rPr lang="en-US" dirty="0"/>
-                  <a:t>B</a:t>
-                </a:r>
-                <a:endParaRPr lang="de-DE" dirty="0"/>
-              </a:p>
-            </p:txBody>
-          </p:sp>
-          <p:sp>
-            <p:nvSpPr>
-              <p:cNvPr id="21" name="TextBox 20">
-                <a:extLst>
-                  <a:ext uri="{FF2B5EF4-FFF2-40B4-BE49-F238E27FC236}">
-                    <a16:creationId xmlns:a16="http://schemas.microsoft.com/office/drawing/2014/main" id="{2DEEEB3F-ACF6-4FD1-8DA1-1147A57D0995}"/>
-                  </a:ext>
-                </a:extLst>
-              </p:cNvPr>
-              <p:cNvSpPr txBox="1"/>
-              <p:nvPr/>
-            </p:nvSpPr>
-            <p:spPr>
-              <a:xfrm>
-                <a:off x="5551714" y="5536706"/>
-                <a:ext cx="363894" cy="369332"/>
-              </a:xfrm>
-              <a:prstGeom prst="rect">
-                <a:avLst/>
-              </a:prstGeom>
-              <a:noFill/>
-            </p:spPr>
-            <p:txBody>
-              <a:bodyPr wrap="square" rtlCol="0">
-                <a:spAutoFit/>
-              </a:bodyPr>
-              <a:lstStyle/>
-              <a:p>
-                <a:r>
-                  <a:rPr lang="en-US" dirty="0"/>
-                  <a:t>C</a:t>
-                </a:r>
-                <a:endParaRPr lang="de-DE" dirty="0"/>
-              </a:p>
-            </p:txBody>
-          </p:sp>
-          <p:sp>
-            <p:nvSpPr>
-              <p:cNvPr id="22" name="TextBox 21">
-                <a:extLst>
-                  <a:ext uri="{FF2B5EF4-FFF2-40B4-BE49-F238E27FC236}">
-                    <a16:creationId xmlns:a16="http://schemas.microsoft.com/office/drawing/2014/main" id="{53E98782-46B9-4372-A334-E341C242C793}"/>
-                  </a:ext>
-                </a:extLst>
-              </p:cNvPr>
-              <p:cNvSpPr txBox="1"/>
-              <p:nvPr/>
-            </p:nvSpPr>
-            <p:spPr>
-              <a:xfrm>
-                <a:off x="2817844" y="2578902"/>
-                <a:ext cx="363894" cy="369332"/>
-              </a:xfrm>
-              <a:prstGeom prst="rect">
-                <a:avLst/>
-              </a:prstGeom>
-              <a:noFill/>
-            </p:spPr>
-            <p:txBody>
-              <a:bodyPr wrap="square" rtlCol="0">
-                <a:spAutoFit/>
-              </a:bodyPr>
-              <a:lstStyle/>
-              <a:p>
-                <a:r>
-                  <a:rPr lang="en-US" dirty="0"/>
-                  <a:t>D</a:t>
-                </a:r>
-                <a:endParaRPr lang="de-DE" dirty="0"/>
-              </a:p>
-            </p:txBody>
-          </p:sp>
-          <p:sp>
-            <p:nvSpPr>
-              <p:cNvPr id="25" name="TextBox 24">
-                <a:extLst>
-                  <a:ext uri="{FF2B5EF4-FFF2-40B4-BE49-F238E27FC236}">
-                    <a16:creationId xmlns:a16="http://schemas.microsoft.com/office/drawing/2014/main" id="{56F46675-68B5-4100-BF20-DC3E25021275}"/>
-                  </a:ext>
-                </a:extLst>
-              </p:cNvPr>
-              <p:cNvSpPr txBox="1"/>
-              <p:nvPr/>
-            </p:nvSpPr>
-            <p:spPr>
-              <a:xfrm>
-                <a:off x="5025970" y="2768141"/>
-                <a:ext cx="293135" cy="369332"/>
-              </a:xfrm>
-              <a:prstGeom prst="rect">
-                <a:avLst/>
-              </a:prstGeom>
-              <a:noFill/>
-            </p:spPr>
-            <p:txBody>
-              <a:bodyPr wrap="square" rtlCol="0">
-                <a:spAutoFit/>
-              </a:bodyPr>
-              <a:lstStyle/>
-              <a:p>
-                <a:r>
-                  <a:rPr lang="en-US" dirty="0"/>
-                  <a:t>O</a:t>
-                </a:r>
-                <a:endParaRPr lang="de-DE" dirty="0"/>
-              </a:p>
-            </p:txBody>
-          </p:sp>
-        </p:grpSp>
-        <p:cxnSp>
-          <p:nvCxnSpPr>
-            <p:cNvPr id="27" name="Straight Connector 26">
-              <a:extLst>
-                <a:ext uri="{FF2B5EF4-FFF2-40B4-BE49-F238E27FC236}">
-                  <a16:creationId xmlns:a16="http://schemas.microsoft.com/office/drawing/2014/main" id="{3DC63D3F-16F2-4222-A687-7CF5AE8C08E9}"/>
-                </a:ext>
-              </a:extLst>
-            </p:cNvPr>
-            <p:cNvCxnSpPr>
-              <a:cxnSpLocks/>
-            </p:cNvCxnSpPr>
-            <p:nvPr/>
-          </p:nvCxnSpPr>
-          <p:spPr>
-            <a:xfrm rot="20673397" flipV="1">
-              <a:off x="1935384" y="2120161"/>
-              <a:ext cx="6869823" cy="3579002"/>
-            </a:xfrm>
-            <a:prstGeom prst="line">
-              <a:avLst/>
-            </a:prstGeom>
-            <a:ln w="76200"/>
-          </p:spPr>
-          <p:style>
-            <a:lnRef idx="1">
-              <a:schemeClr val="accent1"/>
-            </a:lnRef>
-            <a:fillRef idx="0">
-              <a:schemeClr val="accent1"/>
-            </a:fillRef>
-            <a:effectRef idx="0">
-              <a:schemeClr val="accent1"/>
-            </a:effectRef>
-            <a:fontRef idx="minor">
-              <a:schemeClr val="tx1"/>
-            </a:fontRef>
-          </p:style>
-        </p:cxnSp>
-        <p:sp>
-          <p:nvSpPr>
-            <p:cNvPr id="28" name="Arc 27">
-              <a:extLst>
-                <a:ext uri="{FF2B5EF4-FFF2-40B4-BE49-F238E27FC236}">
-                  <a16:creationId xmlns:a16="http://schemas.microsoft.com/office/drawing/2014/main" id="{A86E6E74-D764-4A9D-A9F3-6284D93FE8AE}"/>
-                </a:ext>
-              </a:extLst>
-            </p:cNvPr>
-            <p:cNvSpPr/>
-            <p:nvPr/>
-          </p:nvSpPr>
-          <p:spPr>
-            <a:xfrm rot="4846805">
-              <a:off x="5687205" y="2750837"/>
-              <a:ext cx="1351356" cy="1250080"/>
-            </a:xfrm>
-            <a:prstGeom prst="arc">
-              <a:avLst>
-                <a:gd name="adj1" fmla="val 15323618"/>
-                <a:gd name="adj2" fmla="val 21222868"/>
-              </a:avLst>
-            </a:prstGeom>
-            <a:ln w="76200">
-              <a:solidFill>
-                <a:schemeClr val="accent2">
-                  <a:lumMod val="75000"/>
-                </a:schemeClr>
-              </a:solidFill>
-            </a:ln>
-          </p:spPr>
-          <p:style>
-            <a:lnRef idx="1">
-              <a:schemeClr val="accent1"/>
-            </a:lnRef>
-            <a:fillRef idx="0">
-              <a:schemeClr val="accent1"/>
-            </a:fillRef>
-            <a:effectRef idx="0">
-              <a:schemeClr val="accent1"/>
-            </a:effectRef>
-            <a:fontRef idx="minor">
-              <a:schemeClr val="tx1"/>
-            </a:fontRef>
-          </p:style>
-          <p:txBody>
-            <a:bodyPr rtlCol="0" anchor="ctr"/>
-            <a:lstStyle/>
-            <a:p>
-              <a:pPr algn="ctr"/>
-              <a:endParaRPr lang="de-DE"/>
-            </a:p>
-          </p:txBody>
-        </p:sp>
-        <mc:AlternateContent xmlns:mc="http://schemas.openxmlformats.org/markup-compatibility/2006" xmlns:a14="http://schemas.microsoft.com/office/drawing/2010/main">
-          <mc:Choice Requires="a14">
-            <p:sp>
-              <p:nvSpPr>
-                <p:cNvPr id="29" name="TextBox 28">
-                  <a:extLst>
-                    <a:ext uri="{FF2B5EF4-FFF2-40B4-BE49-F238E27FC236}">
-                      <a16:creationId xmlns:a16="http://schemas.microsoft.com/office/drawing/2014/main" id="{F6E2C876-06F5-4F92-8F82-F6EDDCE922A1}"/>
-                    </a:ext>
-                  </a:extLst>
-                </p:cNvPr>
-                <p:cNvSpPr txBox="1"/>
-                <p:nvPr/>
-              </p:nvSpPr>
-              <p:spPr>
-                <a:xfrm>
-                  <a:off x="6305930" y="2855941"/>
-                  <a:ext cx="531844" cy="369332"/>
-                </a:xfrm>
-                <a:prstGeom prst="rect">
-                  <a:avLst/>
-                </a:prstGeom>
-                <a:noFill/>
-              </p:spPr>
-              <p:txBody>
-                <a:bodyPr wrap="square" lIns="0" tIns="0" rIns="0" bIns="0" rtlCol="0">
-                  <a:spAutoFit/>
-                </a:bodyPr>
-                <a:lstStyle/>
-                <a:p>
-                  <a:pPr/>
-                  <a14:m>
-                    <m:oMathPara xmlns:m="http://schemas.openxmlformats.org/officeDocument/2006/math">
-                      <m:oMathParaPr>
-                        <m:jc m:val="centerGroup"/>
-                      </m:oMathParaPr>
-                      <m:oMath xmlns:m="http://schemas.openxmlformats.org/officeDocument/2006/math">
-                        <m:r>
-                          <a:rPr lang="de-DE" sz="2400" smtClean="0">
-                            <a:latin typeface="Cambria Math" panose="02040503050406030204" pitchFamily="18" charset="0"/>
-                          </a:rPr>
-                          <m:t>∝</m:t>
-                        </m:r>
-                      </m:oMath>
-                    </m:oMathPara>
-                  </a14:m>
-                  <a:endParaRPr lang="de-DE" sz="2400" dirty="0"/>
-                </a:p>
-              </p:txBody>
-            </p:sp>
-          </mc:Choice>
-          <mc:Fallback xmlns="">
-            <p:sp>
-              <p:nvSpPr>
-                <p:cNvPr id="29" name="TextBox 28">
-                  <a:extLst>
-                    <a:ext uri="{FF2B5EF4-FFF2-40B4-BE49-F238E27FC236}">
-                      <a16:creationId xmlns:a16="http://schemas.microsoft.com/office/drawing/2014/main" id="{F6E2C876-06F5-4F92-8F82-F6EDDCE922A1}"/>
-                    </a:ext>
-                  </a:extLst>
-                </p:cNvPr>
-                <p:cNvSpPr txBox="1">
-                  <a:spLocks noRot="1" noChangeAspect="1" noMove="1" noResize="1" noEditPoints="1" noAdjustHandles="1" noChangeArrowheads="1" noChangeShapeType="1" noTextEdit="1"/>
-                </p:cNvSpPr>
-                <p:nvPr/>
-              </p:nvSpPr>
-              <p:spPr>
-                <a:xfrm>
-                  <a:off x="6305930" y="2855941"/>
-                  <a:ext cx="531844" cy="369332"/>
-                </a:xfrm>
-                <a:prstGeom prst="rect">
-                  <a:avLst/>
-                </a:prstGeom>
-                <a:blipFill>
-                  <a:blip r:embed="rId2"/>
-                  <a:stretch>
-                    <a:fillRect/>
-                  </a:stretch>
-                </a:blipFill>
-              </p:spPr>
-              <p:txBody>
-                <a:bodyPr/>
-                <a:lstStyle/>
-                <a:p>
-                  <a:r>
-                    <a:rPr lang="de-DE">
-                      <a:noFill/>
-                    </a:rPr>
-                    <a:t> </a:t>
-                  </a:r>
-                </a:p>
-              </p:txBody>
-            </p:sp>
-          </mc:Fallback>
-        </mc:AlternateContent>
-        <p:sp>
-          <p:nvSpPr>
-            <p:cNvPr id="30" name="Arc 29">
-              <a:extLst>
-                <a:ext uri="{FF2B5EF4-FFF2-40B4-BE49-F238E27FC236}">
-                  <a16:creationId xmlns:a16="http://schemas.microsoft.com/office/drawing/2014/main" id="{446AAB76-8506-437A-AA28-3EC92D76C622}"/>
-                </a:ext>
-              </a:extLst>
-            </p:cNvPr>
-            <p:cNvSpPr/>
-            <p:nvPr/>
-          </p:nvSpPr>
-          <p:spPr>
-            <a:xfrm>
-              <a:off x="6202983" y="2852629"/>
-              <a:ext cx="612307" cy="814957"/>
-            </a:xfrm>
-            <a:prstGeom prst="arc">
-              <a:avLst>
-                <a:gd name="adj1" fmla="val 16482838"/>
-                <a:gd name="adj2" fmla="val 20089878"/>
-              </a:avLst>
-            </a:prstGeom>
-            <a:ln w="76200">
-              <a:solidFill>
-                <a:srgbClr val="FF0000"/>
-              </a:solidFill>
-            </a:ln>
-          </p:spPr>
-          <p:style>
-            <a:lnRef idx="1">
-              <a:schemeClr val="accent1"/>
-            </a:lnRef>
-            <a:fillRef idx="0">
-              <a:schemeClr val="accent1"/>
-            </a:fillRef>
-            <a:effectRef idx="0">
-              <a:schemeClr val="accent1"/>
-            </a:effectRef>
-            <a:fontRef idx="minor">
-              <a:schemeClr val="tx1"/>
-            </a:fontRef>
-          </p:style>
-          <p:txBody>
-            <a:bodyPr rtlCol="0" anchor="ctr"/>
-            <a:lstStyle/>
-            <a:p>
-              <a:pPr algn="ctr"/>
-              <a:endParaRPr lang="de-DE"/>
-            </a:p>
-          </p:txBody>
-        </p:sp>
-        <p:cxnSp>
-          <p:nvCxnSpPr>
-            <p:cNvPr id="36" name="Straight Arrow Connector 35">
-              <a:extLst>
-                <a:ext uri="{FF2B5EF4-FFF2-40B4-BE49-F238E27FC236}">
-                  <a16:creationId xmlns:a16="http://schemas.microsoft.com/office/drawing/2014/main" id="{6FAB4DB3-8317-402B-A34D-27EF74608709}"/>
-                </a:ext>
-              </a:extLst>
-            </p:cNvPr>
-            <p:cNvCxnSpPr>
-              <a:cxnSpLocks/>
-            </p:cNvCxnSpPr>
-            <p:nvPr/>
-          </p:nvCxnSpPr>
-          <p:spPr>
-            <a:xfrm rot="20673397" flipH="1">
-              <a:off x="6508632" y="1104218"/>
-              <a:ext cx="3206623" cy="1440467"/>
-            </a:xfrm>
-            <a:prstGeom prst="straightConnector1">
-              <a:avLst/>
-            </a:prstGeom>
-            <a:ln w="57150">
-              <a:tailEnd type="triangle"/>
-            </a:ln>
-          </p:spPr>
-          <p:style>
-            <a:lnRef idx="1">
-              <a:schemeClr val="accent1"/>
-            </a:lnRef>
-            <a:fillRef idx="0">
-              <a:schemeClr val="accent1"/>
-            </a:fillRef>
-            <a:effectRef idx="0">
-              <a:schemeClr val="accent1"/>
-            </a:effectRef>
-            <a:fontRef idx="minor">
-              <a:schemeClr val="tx1"/>
-            </a:fontRef>
-          </p:style>
-        </p:cxnSp>
-        <mc:AlternateContent xmlns:mc="http://schemas.openxmlformats.org/markup-compatibility/2006" xmlns:a14="http://schemas.microsoft.com/office/drawing/2010/main">
-          <mc:Choice Requires="a14">
-            <p:sp>
-              <p:nvSpPr>
-                <p:cNvPr id="61" name="TextBox 60">
-                  <a:extLst>
-                    <a:ext uri="{FF2B5EF4-FFF2-40B4-BE49-F238E27FC236}">
-                      <a16:creationId xmlns:a16="http://schemas.microsoft.com/office/drawing/2014/main" id="{4A38554A-CB16-469A-AD2C-4666AA77B48C}"/>
-                    </a:ext>
-                  </a:extLst>
-                </p:cNvPr>
-                <p:cNvSpPr txBox="1"/>
-                <p:nvPr/>
-              </p:nvSpPr>
-              <p:spPr>
-                <a:xfrm>
-                  <a:off x="5969416" y="3770647"/>
-                  <a:ext cx="531844" cy="369332"/>
-                </a:xfrm>
-                <a:prstGeom prst="rect">
-                  <a:avLst/>
-                </a:prstGeom>
-                <a:noFill/>
-              </p:spPr>
-              <p:txBody>
-                <a:bodyPr wrap="square" lIns="0" tIns="0" rIns="0" bIns="0" rtlCol="0">
-                  <a:spAutoFit/>
-                </a:bodyPr>
-                <a:lstStyle/>
-                <a:p>
-                  <a:pPr/>
-                  <a14:m>
-                    <m:oMathPara xmlns:m="http://schemas.openxmlformats.org/officeDocument/2006/math">
-                      <m:oMathParaPr>
-                        <m:jc m:val="centerGroup"/>
-                      </m:oMathParaPr>
-                      <m:oMath xmlns:m="http://schemas.openxmlformats.org/officeDocument/2006/math">
-                        <m:r>
-                          <a:rPr lang="de-DE" sz="2400" smtClean="0">
-                            <a:latin typeface="Cambria Math" panose="02040503050406030204" pitchFamily="18" charset="0"/>
-                          </a:rPr>
-                          <m:t>∝</m:t>
-                        </m:r>
-                      </m:oMath>
-                    </m:oMathPara>
-                  </a14:m>
-                  <a:endParaRPr lang="de-DE" sz="2400" dirty="0"/>
-                </a:p>
-              </p:txBody>
-            </p:sp>
-          </mc:Choice>
-          <mc:Fallback xmlns="">
-            <p:sp>
-              <p:nvSpPr>
-                <p:cNvPr id="61" name="TextBox 60">
-                  <a:extLst>
-                    <a:ext uri="{FF2B5EF4-FFF2-40B4-BE49-F238E27FC236}">
-                      <a16:creationId xmlns:a16="http://schemas.microsoft.com/office/drawing/2014/main" id="{4A38554A-CB16-469A-AD2C-4666AA77B48C}"/>
-                    </a:ext>
-                  </a:extLst>
-                </p:cNvPr>
-                <p:cNvSpPr txBox="1">
-                  <a:spLocks noRot="1" noChangeAspect="1" noMove="1" noResize="1" noEditPoints="1" noAdjustHandles="1" noChangeArrowheads="1" noChangeShapeType="1" noTextEdit="1"/>
-                </p:cNvSpPr>
-                <p:nvPr/>
-              </p:nvSpPr>
-              <p:spPr>
-                <a:xfrm>
-                  <a:off x="5969416" y="3770647"/>
-                  <a:ext cx="531844" cy="369332"/>
-                </a:xfrm>
-                <a:prstGeom prst="rect">
-                  <a:avLst/>
-                </a:prstGeom>
-                <a:blipFill>
-                  <a:blip r:embed="rId3"/>
-                  <a:stretch>
-                    <a:fillRect/>
-                  </a:stretch>
-                </a:blipFill>
-              </p:spPr>
-              <p:txBody>
-                <a:bodyPr/>
-                <a:lstStyle/>
-                <a:p>
-                  <a:r>
-                    <a:rPr lang="de-DE">
-                      <a:noFill/>
-                    </a:rPr>
-                    <a:t> </a:t>
-                  </a:r>
-                </a:p>
-              </p:txBody>
-            </p:sp>
-          </mc:Fallback>
-        </mc:AlternateContent>
-        <p:sp>
-          <p:nvSpPr>
-            <p:cNvPr id="62" name="Arc 61">
-              <a:extLst>
-                <a:ext uri="{FF2B5EF4-FFF2-40B4-BE49-F238E27FC236}">
-                  <a16:creationId xmlns:a16="http://schemas.microsoft.com/office/drawing/2014/main" id="{613AF230-3706-4B14-B1F7-D756AAA6381A}"/>
-                </a:ext>
-              </a:extLst>
-            </p:cNvPr>
-            <p:cNvSpPr/>
-            <p:nvPr/>
-          </p:nvSpPr>
-          <p:spPr>
-            <a:xfrm rot="5585854">
-              <a:off x="5812837" y="3622435"/>
-              <a:ext cx="612307" cy="814957"/>
-            </a:xfrm>
-            <a:prstGeom prst="arc">
-              <a:avLst>
-                <a:gd name="adj1" fmla="val 16482838"/>
-                <a:gd name="adj2" fmla="val 20089878"/>
-              </a:avLst>
-            </a:prstGeom>
-            <a:ln w="76200">
-              <a:solidFill>
-                <a:srgbClr val="FF0000"/>
-              </a:solidFill>
-            </a:ln>
-          </p:spPr>
-          <p:style>
-            <a:lnRef idx="1">
-              <a:schemeClr val="accent1"/>
-            </a:lnRef>
-            <a:fillRef idx="0">
-              <a:schemeClr val="accent1"/>
-            </a:fillRef>
-            <a:effectRef idx="0">
-              <a:schemeClr val="accent1"/>
-            </a:effectRef>
-            <a:fontRef idx="minor">
-              <a:schemeClr val="tx1"/>
-            </a:fontRef>
-          </p:style>
-          <p:txBody>
-            <a:bodyPr rtlCol="0" anchor="ctr"/>
-            <a:lstStyle/>
-            <a:p>
-              <a:pPr algn="ctr"/>
-              <a:endParaRPr lang="de-DE"/>
-            </a:p>
-          </p:txBody>
-        </p:sp>
-      </p:grpSp>
-      <p:sp>
-        <p:nvSpPr>
-          <p:cNvPr id="41" name="TextBox 40">
-            <a:extLst>
-              <a:ext uri="{FF2B5EF4-FFF2-40B4-BE49-F238E27FC236}">
-                <a16:creationId xmlns:a16="http://schemas.microsoft.com/office/drawing/2014/main" id="{5208DCA0-7F66-4763-A360-B8885411DB25}"/>
-              </a:ext>
-            </a:extLst>
-          </p:cNvPr>
-          <p:cNvSpPr txBox="1"/>
-          <p:nvPr/>
-        </p:nvSpPr>
-        <p:spPr>
-          <a:xfrm>
-            <a:off x="9826052" y="1146972"/>
-            <a:ext cx="2227491" cy="646331"/>
-          </a:xfrm>
-          <a:prstGeom prst="rect">
-            <a:avLst/>
-          </a:prstGeom>
-          <a:noFill/>
-        </p:spPr>
-        <p:txBody>
-          <a:bodyPr wrap="square" rtlCol="0">
-            <a:spAutoFit/>
-          </a:bodyPr>
-          <a:lstStyle/>
-          <a:p>
-            <a:r>
-              <a:rPr lang="en-US" dirty="0"/>
-              <a:t>Given angle by the user</a:t>
-            </a:r>
-            <a:endParaRPr lang="de-DE" dirty="0"/>
-          </a:p>
-        </p:txBody>
-      </p:sp>
-      <p:cxnSp>
-        <p:nvCxnSpPr>
-          <p:cNvPr id="50" name="Straight Connector 49">
-            <a:extLst>
-              <a:ext uri="{FF2B5EF4-FFF2-40B4-BE49-F238E27FC236}">
-                <a16:creationId xmlns:a16="http://schemas.microsoft.com/office/drawing/2014/main" id="{998E38AF-31B6-4BA7-80E6-48EE8D337EB7}"/>
-              </a:ext>
-            </a:extLst>
-          </p:cNvPr>
-          <p:cNvCxnSpPr>
-            <a:cxnSpLocks/>
-            <a:endCxn id="18" idx="1"/>
-          </p:cNvCxnSpPr>
-          <p:nvPr/>
-        </p:nvCxnSpPr>
-        <p:spPr>
-          <a:xfrm flipH="1">
-            <a:off x="6837616" y="3397920"/>
-            <a:ext cx="3316379" cy="1716123"/>
-          </a:xfrm>
-          <a:prstGeom prst="line">
-            <a:avLst/>
-          </a:prstGeom>
-          <a:ln w="38100">
-            <a:solidFill>
-              <a:srgbClr val="FFC000"/>
-            </a:solidFill>
-          </a:ln>
-        </p:spPr>
-        <p:style>
-          <a:lnRef idx="1">
-            <a:schemeClr val="accent1"/>
-          </a:lnRef>
-          <a:fillRef idx="0">
-            <a:schemeClr val="accent1"/>
-          </a:fillRef>
-          <a:effectRef idx="0">
-            <a:schemeClr val="accent1"/>
-          </a:effectRef>
-          <a:fontRef idx="minor">
-            <a:schemeClr val="tx1"/>
-          </a:fontRef>
-        </p:style>
-      </p:cxnSp>
-      <p:cxnSp>
-        <p:nvCxnSpPr>
-          <p:cNvPr id="52" name="Straight Connector 51">
-            <a:extLst>
-              <a:ext uri="{FF2B5EF4-FFF2-40B4-BE49-F238E27FC236}">
-                <a16:creationId xmlns:a16="http://schemas.microsoft.com/office/drawing/2014/main" id="{A00677D0-418F-4936-8759-A13C3EEEE0D5}"/>
-              </a:ext>
-            </a:extLst>
-          </p:cNvPr>
-          <p:cNvCxnSpPr>
-            <a:cxnSpLocks/>
-          </p:cNvCxnSpPr>
-          <p:nvPr/>
-        </p:nvCxnSpPr>
-        <p:spPr>
-          <a:xfrm>
-            <a:off x="8028166" y="4478490"/>
-            <a:ext cx="317427" cy="621730"/>
-          </a:xfrm>
-          <a:prstGeom prst="line">
-            <a:avLst/>
-          </a:prstGeom>
-          <a:ln w="38100">
-            <a:solidFill>
-              <a:srgbClr val="FF0000"/>
-            </a:solidFill>
-          </a:ln>
-        </p:spPr>
-        <p:style>
-          <a:lnRef idx="1">
-            <a:schemeClr val="accent1"/>
-          </a:lnRef>
-          <a:fillRef idx="0">
-            <a:schemeClr val="accent1"/>
-          </a:fillRef>
-          <a:effectRef idx="0">
-            <a:schemeClr val="accent1"/>
-          </a:effectRef>
-          <a:fontRef idx="minor">
-            <a:schemeClr val="tx1"/>
-          </a:fontRef>
-        </p:style>
-      </p:cxnSp>
-      <p:cxnSp>
-        <p:nvCxnSpPr>
-          <p:cNvPr id="53" name="Straight Connector 52">
-            <a:extLst>
-              <a:ext uri="{FF2B5EF4-FFF2-40B4-BE49-F238E27FC236}">
-                <a16:creationId xmlns:a16="http://schemas.microsoft.com/office/drawing/2014/main" id="{6500FFE1-D533-4B8F-87D3-30A683942C37}"/>
-              </a:ext>
-            </a:extLst>
-          </p:cNvPr>
-          <p:cNvCxnSpPr>
-            <a:cxnSpLocks/>
-            <a:endCxn id="18" idx="1"/>
-          </p:cNvCxnSpPr>
-          <p:nvPr/>
-        </p:nvCxnSpPr>
-        <p:spPr>
-          <a:xfrm flipH="1" flipV="1">
-            <a:off x="6837616" y="5114043"/>
-            <a:ext cx="511814" cy="896182"/>
-          </a:xfrm>
-          <a:prstGeom prst="line">
-            <a:avLst/>
-          </a:prstGeom>
-          <a:ln w="76200">
-            <a:solidFill>
-              <a:srgbClr val="FF0000"/>
-            </a:solidFill>
-          </a:ln>
-        </p:spPr>
-        <p:style>
-          <a:lnRef idx="1">
-            <a:schemeClr val="accent1"/>
-          </a:lnRef>
-          <a:fillRef idx="0">
-            <a:schemeClr val="accent1"/>
-          </a:fillRef>
-          <a:effectRef idx="0">
-            <a:schemeClr val="accent1"/>
-          </a:effectRef>
-          <a:fontRef idx="minor">
-            <a:schemeClr val="tx1"/>
-          </a:fontRef>
-        </p:style>
-      </p:cxnSp>
-      <p:cxnSp>
-        <p:nvCxnSpPr>
-          <p:cNvPr id="55" name="Straight Connector 54">
-            <a:extLst>
-              <a:ext uri="{FF2B5EF4-FFF2-40B4-BE49-F238E27FC236}">
-                <a16:creationId xmlns:a16="http://schemas.microsoft.com/office/drawing/2014/main" id="{401EEF82-99E1-4A6F-B51D-FC8AD5A59373}"/>
-              </a:ext>
-            </a:extLst>
-          </p:cNvPr>
-          <p:cNvCxnSpPr>
-            <a:cxnSpLocks/>
-          </p:cNvCxnSpPr>
-          <p:nvPr/>
-        </p:nvCxnSpPr>
-        <p:spPr>
-          <a:xfrm flipH="1" flipV="1">
-            <a:off x="10135417" y="3404079"/>
-            <a:ext cx="477140" cy="774092"/>
-          </a:xfrm>
-          <a:prstGeom prst="line">
-            <a:avLst/>
-          </a:prstGeom>
-          <a:ln w="38100">
-            <a:solidFill>
-              <a:srgbClr val="FF0000"/>
-            </a:solidFill>
-          </a:ln>
-        </p:spPr>
-        <p:style>
-          <a:lnRef idx="1">
-            <a:schemeClr val="accent1"/>
-          </a:lnRef>
-          <a:fillRef idx="0">
-            <a:schemeClr val="accent1"/>
-          </a:fillRef>
-          <a:effectRef idx="0">
-            <a:schemeClr val="accent1"/>
-          </a:effectRef>
-          <a:fontRef idx="minor">
-            <a:schemeClr val="tx1"/>
-          </a:fontRef>
-        </p:style>
-      </p:cxnSp>
-      <p:cxnSp>
-        <p:nvCxnSpPr>
-          <p:cNvPr id="59" name="Straight Connector 58">
-            <a:extLst>
-              <a:ext uri="{FF2B5EF4-FFF2-40B4-BE49-F238E27FC236}">
-                <a16:creationId xmlns:a16="http://schemas.microsoft.com/office/drawing/2014/main" id="{CEBBF594-B72D-4631-B8A1-ED3F852B5F54}"/>
-              </a:ext>
-            </a:extLst>
-          </p:cNvPr>
-          <p:cNvCxnSpPr>
-            <a:cxnSpLocks/>
-          </p:cNvCxnSpPr>
-          <p:nvPr/>
-        </p:nvCxnSpPr>
-        <p:spPr>
-          <a:xfrm flipV="1">
-            <a:off x="7296178" y="4002085"/>
-            <a:ext cx="3219781" cy="1873391"/>
-          </a:xfrm>
-          <a:prstGeom prst="line">
-            <a:avLst/>
-          </a:prstGeom>
-          <a:ln w="38100">
-            <a:solidFill>
-              <a:schemeClr val="tx1"/>
-            </a:solidFill>
-          </a:ln>
-        </p:spPr>
-        <p:style>
-          <a:lnRef idx="1">
-            <a:schemeClr val="accent1"/>
-          </a:lnRef>
-          <a:fillRef idx="0">
-            <a:schemeClr val="accent1"/>
-          </a:fillRef>
-          <a:effectRef idx="0">
-            <a:schemeClr val="accent1"/>
-          </a:effectRef>
-          <a:fontRef idx="minor">
-            <a:schemeClr val="tx1"/>
-          </a:fontRef>
-        </p:style>
-      </p:cxnSp>
-      <p:cxnSp>
-        <p:nvCxnSpPr>
-          <p:cNvPr id="60" name="Straight Connector 59">
-            <a:extLst>
-              <a:ext uri="{FF2B5EF4-FFF2-40B4-BE49-F238E27FC236}">
-                <a16:creationId xmlns:a16="http://schemas.microsoft.com/office/drawing/2014/main" id="{D7F3C24E-4E9B-4C48-A93D-689E127619FA}"/>
-              </a:ext>
-            </a:extLst>
-          </p:cNvPr>
-          <p:cNvCxnSpPr>
-            <a:cxnSpLocks/>
-          </p:cNvCxnSpPr>
-          <p:nvPr/>
-        </p:nvCxnSpPr>
-        <p:spPr>
-          <a:xfrm flipV="1">
-            <a:off x="7133929" y="4938780"/>
-            <a:ext cx="1154539" cy="634833"/>
-          </a:xfrm>
-          <a:prstGeom prst="line">
-            <a:avLst/>
-          </a:prstGeom>
-          <a:ln w="38100">
-            <a:solidFill>
-              <a:schemeClr val="tx1"/>
-            </a:solidFill>
-          </a:ln>
-        </p:spPr>
-        <p:style>
-          <a:lnRef idx="1">
-            <a:schemeClr val="accent1"/>
-          </a:lnRef>
-          <a:fillRef idx="0">
-            <a:schemeClr val="accent1"/>
-          </a:fillRef>
-          <a:effectRef idx="0">
-            <a:schemeClr val="accent1"/>
-          </a:effectRef>
-          <a:fontRef idx="minor">
-            <a:schemeClr val="tx1"/>
-          </a:fontRef>
-        </p:style>
-      </p:cxnSp>
-      <p:sp>
-        <p:nvSpPr>
-          <p:cNvPr id="63" name="TextBox 62">
-            <a:extLst>
-              <a:ext uri="{FF2B5EF4-FFF2-40B4-BE49-F238E27FC236}">
-                <a16:creationId xmlns:a16="http://schemas.microsoft.com/office/drawing/2014/main" id="{7F683D98-46E4-4DFB-9026-49B2E72985D3}"/>
-              </a:ext>
-            </a:extLst>
-          </p:cNvPr>
-          <p:cNvSpPr txBox="1"/>
-          <p:nvPr/>
-        </p:nvSpPr>
-        <p:spPr>
-          <a:xfrm rot="19824882">
-            <a:off x="8689277" y="3993505"/>
-            <a:ext cx="1547498" cy="369332"/>
-          </a:xfrm>
-          <a:prstGeom prst="rect">
-            <a:avLst/>
-          </a:prstGeom>
-          <a:noFill/>
-        </p:spPr>
-        <p:txBody>
-          <a:bodyPr wrap="square" rtlCol="0">
-            <a:spAutoFit/>
-          </a:bodyPr>
-          <a:lstStyle/>
-          <a:p>
-            <a:r>
-              <a:rPr lang="en-US" dirty="0" err="1"/>
-              <a:t>Checklength</a:t>
-            </a:r>
-            <a:r>
-              <a:rPr lang="en-US" dirty="0"/>
-              <a:t> 1</a:t>
-            </a:r>
-            <a:endParaRPr lang="de-DE" dirty="0"/>
-          </a:p>
-        </p:txBody>
-      </p:sp>
-      <p:sp>
-        <p:nvSpPr>
-          <p:cNvPr id="64" name="TextBox 63">
-            <a:extLst>
-              <a:ext uri="{FF2B5EF4-FFF2-40B4-BE49-F238E27FC236}">
-                <a16:creationId xmlns:a16="http://schemas.microsoft.com/office/drawing/2014/main" id="{12661769-541C-4103-BDD4-9A9A2B936FA1}"/>
-              </a:ext>
-            </a:extLst>
-          </p:cNvPr>
-          <p:cNvSpPr txBox="1"/>
-          <p:nvPr/>
-        </p:nvSpPr>
-        <p:spPr>
-          <a:xfrm rot="19820791">
-            <a:off x="6810062" y="4858662"/>
-            <a:ext cx="1532940" cy="369332"/>
-          </a:xfrm>
-          <a:prstGeom prst="rect">
-            <a:avLst/>
-          </a:prstGeom>
-          <a:noFill/>
-        </p:spPr>
-        <p:txBody>
-          <a:bodyPr wrap="square" rtlCol="0">
-            <a:spAutoFit/>
-          </a:bodyPr>
-          <a:lstStyle/>
-          <a:p>
-            <a:r>
-              <a:rPr lang="en-US" dirty="0" err="1"/>
-              <a:t>Checklength</a:t>
-            </a:r>
-            <a:r>
-              <a:rPr lang="en-US" dirty="0"/>
-              <a:t> 2</a:t>
-            </a:r>
-            <a:endParaRPr lang="de-DE" dirty="0"/>
-          </a:p>
-        </p:txBody>
-      </p:sp>
-      <p:sp>
-        <p:nvSpPr>
-          <p:cNvPr id="65" name="TextBox 64">
-            <a:extLst>
-              <a:ext uri="{FF2B5EF4-FFF2-40B4-BE49-F238E27FC236}">
-                <a16:creationId xmlns:a16="http://schemas.microsoft.com/office/drawing/2014/main" id="{8818662D-EE6D-45B1-9150-6BFA77C4C8FA}"/>
-              </a:ext>
-            </a:extLst>
-          </p:cNvPr>
-          <p:cNvSpPr txBox="1"/>
-          <p:nvPr/>
-        </p:nvSpPr>
-        <p:spPr>
-          <a:xfrm>
-            <a:off x="84100" y="20511"/>
-            <a:ext cx="3820041" cy="2554545"/>
-          </a:xfrm>
-          <a:prstGeom prst="rect">
-            <a:avLst/>
-          </a:prstGeom>
-          <a:noFill/>
-        </p:spPr>
-        <p:txBody>
-          <a:bodyPr wrap="square" rtlCol="0">
-            <a:spAutoFit/>
-          </a:bodyPr>
-          <a:lstStyle/>
-          <a:p>
-            <a:pPr marL="285750" indent="-285750">
-              <a:buFont typeface="Arial" panose="020B0604020202020204" pitchFamily="34" charset="0"/>
-              <a:buChar char="•"/>
-            </a:pPr>
-            <a:r>
-              <a:rPr lang="en-US" sz="1600" dirty="0"/>
-              <a:t>If </a:t>
-            </a:r>
-            <a:r>
-              <a:rPr lang="en-US" sz="1600" dirty="0" err="1"/>
-              <a:t>checklength</a:t>
-            </a:r>
-            <a:r>
-              <a:rPr lang="en-US" sz="1600" dirty="0"/>
-              <a:t> 1 is greater than </a:t>
-            </a:r>
-            <a:r>
-              <a:rPr lang="en-US" sz="1600" dirty="0" err="1"/>
-              <a:t>checklength</a:t>
-            </a:r>
-            <a:r>
-              <a:rPr lang="en-US" sz="1600" dirty="0"/>
-              <a:t> 2 the Y-Pos of the point B is negative like described in the picture</a:t>
-            </a:r>
-          </a:p>
-          <a:p>
-            <a:pPr marL="285750" indent="-285750">
-              <a:buFont typeface="Arial" panose="020B0604020202020204" pitchFamily="34" charset="0"/>
-              <a:buChar char="•"/>
-            </a:pPr>
-            <a:endParaRPr lang="en-US" sz="1600" dirty="0"/>
-          </a:p>
-          <a:p>
-            <a:pPr marL="285750" indent="-285750">
-              <a:buFont typeface="Arial" panose="020B0604020202020204" pitchFamily="34" charset="0"/>
-              <a:buChar char="•"/>
-            </a:pPr>
-            <a:r>
-              <a:rPr lang="en-US" sz="1600" dirty="0"/>
-              <a:t>If </a:t>
-            </a:r>
-            <a:r>
-              <a:rPr lang="en-US" sz="1600" dirty="0" err="1"/>
-              <a:t>checklength</a:t>
-            </a:r>
-            <a:r>
-              <a:rPr lang="en-US" sz="1600" dirty="0"/>
-              <a:t> 1 is smaller than </a:t>
-            </a:r>
-            <a:r>
-              <a:rPr lang="en-US" sz="1600" dirty="0" err="1"/>
-              <a:t>checklength</a:t>
-            </a:r>
-            <a:r>
-              <a:rPr lang="en-US" sz="1600" dirty="0"/>
-              <a:t> 2 the Y-Pos of the point B is positive.</a:t>
-            </a:r>
-          </a:p>
-          <a:p>
-            <a:pPr marL="285750" indent="-285750">
-              <a:buFont typeface="Arial" panose="020B0604020202020204" pitchFamily="34" charset="0"/>
-              <a:buChar char="•"/>
-            </a:pPr>
-            <a:endParaRPr lang="en-US" sz="1600" dirty="0"/>
-          </a:p>
-          <a:p>
-            <a:pPr marL="285750" indent="-285750">
-              <a:buFont typeface="Arial" panose="020B0604020202020204" pitchFamily="34" charset="0"/>
-              <a:buChar char="•"/>
-            </a:pPr>
-            <a:r>
-              <a:rPr lang="en-US" sz="1600" dirty="0"/>
-              <a:t>If </a:t>
-            </a:r>
-            <a:r>
-              <a:rPr lang="en-US" sz="1600" dirty="0" err="1"/>
-              <a:t>checklength</a:t>
-            </a:r>
-            <a:r>
-              <a:rPr lang="en-US" sz="1600" dirty="0"/>
-              <a:t> 1 is equal to </a:t>
-            </a:r>
-            <a:r>
-              <a:rPr lang="en-US" sz="1600" dirty="0" err="1"/>
-              <a:t>checklength</a:t>
-            </a:r>
-            <a:r>
-              <a:rPr lang="en-US" sz="1600" dirty="0"/>
-              <a:t> 2 point B is 0 – sits on the X-axis</a:t>
-            </a:r>
-            <a:endParaRPr lang="de-DE" sz="1600" dirty="0"/>
-          </a:p>
-        </p:txBody>
-      </p:sp>
-      <p:cxnSp>
-        <p:nvCxnSpPr>
-          <p:cNvPr id="66" name="Straight Connector 65">
-            <a:extLst>
-              <a:ext uri="{FF2B5EF4-FFF2-40B4-BE49-F238E27FC236}">
-                <a16:creationId xmlns:a16="http://schemas.microsoft.com/office/drawing/2014/main" id="{52346800-CEB8-49DD-A665-7CEB025FD4A0}"/>
-              </a:ext>
-            </a:extLst>
-          </p:cNvPr>
-          <p:cNvCxnSpPr>
-            <a:cxnSpLocks/>
-          </p:cNvCxnSpPr>
-          <p:nvPr/>
-        </p:nvCxnSpPr>
-        <p:spPr>
-          <a:xfrm flipV="1">
-            <a:off x="6773163" y="4799906"/>
-            <a:ext cx="178668" cy="115136"/>
-          </a:xfrm>
-          <a:prstGeom prst="line">
-            <a:avLst/>
-          </a:prstGeom>
-          <a:ln w="38100">
-            <a:solidFill>
-              <a:srgbClr val="FF0000"/>
-            </a:solidFill>
-          </a:ln>
-        </p:spPr>
-        <p:style>
-          <a:lnRef idx="1">
-            <a:schemeClr val="accent1"/>
-          </a:lnRef>
-          <a:fillRef idx="0">
-            <a:schemeClr val="accent1"/>
-          </a:fillRef>
-          <a:effectRef idx="0">
-            <a:schemeClr val="accent1"/>
-          </a:effectRef>
-          <a:fontRef idx="minor">
-            <a:schemeClr val="tx1"/>
-          </a:fontRef>
-        </p:style>
-      </p:cxnSp>
-      <p:cxnSp>
-        <p:nvCxnSpPr>
-          <p:cNvPr id="70" name="Straight Connector 69">
-            <a:extLst>
-              <a:ext uri="{FF2B5EF4-FFF2-40B4-BE49-F238E27FC236}">
-                <a16:creationId xmlns:a16="http://schemas.microsoft.com/office/drawing/2014/main" id="{FA89FA7E-7A80-4064-945F-7EE60401530A}"/>
-              </a:ext>
-            </a:extLst>
-          </p:cNvPr>
-          <p:cNvCxnSpPr>
-            <a:cxnSpLocks/>
-          </p:cNvCxnSpPr>
-          <p:nvPr/>
-        </p:nvCxnSpPr>
-        <p:spPr>
-          <a:xfrm flipH="1" flipV="1">
-            <a:off x="6934348" y="4799296"/>
-            <a:ext cx="102830" cy="173315"/>
-          </a:xfrm>
-          <a:prstGeom prst="line">
-            <a:avLst/>
-          </a:prstGeom>
-          <a:ln w="38100">
-            <a:solidFill>
-              <a:srgbClr val="FF0000"/>
-            </a:solidFill>
-          </a:ln>
-        </p:spPr>
-        <p:style>
-          <a:lnRef idx="1">
-            <a:schemeClr val="accent1"/>
-          </a:lnRef>
-          <a:fillRef idx="0">
-            <a:schemeClr val="accent1"/>
-          </a:fillRef>
-          <a:effectRef idx="0">
-            <a:schemeClr val="accent1"/>
-          </a:effectRef>
-          <a:fontRef idx="minor">
-            <a:schemeClr val="tx1"/>
-          </a:fontRef>
-        </p:style>
-      </p:cxnSp>
-      <p:sp>
-        <p:nvSpPr>
-          <p:cNvPr id="72" name="TextBox 71">
-            <a:extLst>
-              <a:ext uri="{FF2B5EF4-FFF2-40B4-BE49-F238E27FC236}">
-                <a16:creationId xmlns:a16="http://schemas.microsoft.com/office/drawing/2014/main" id="{003318EF-9250-44CA-8849-D513E1F40B67}"/>
-              </a:ext>
-            </a:extLst>
-          </p:cNvPr>
-          <p:cNvSpPr txBox="1"/>
-          <p:nvPr/>
-        </p:nvSpPr>
-        <p:spPr>
-          <a:xfrm>
-            <a:off x="7263947" y="2757593"/>
-            <a:ext cx="447040" cy="369332"/>
-          </a:xfrm>
-          <a:prstGeom prst="rect">
-            <a:avLst/>
-          </a:prstGeom>
-          <a:noFill/>
-        </p:spPr>
-        <p:txBody>
-          <a:bodyPr wrap="square" rtlCol="0">
-            <a:spAutoFit/>
-          </a:bodyPr>
-          <a:lstStyle/>
-          <a:p>
-            <a:r>
-              <a:rPr lang="en-US" dirty="0"/>
-              <a:t>P</a:t>
-            </a:r>
-            <a:endParaRPr lang="de-DE" dirty="0"/>
-          </a:p>
-        </p:txBody>
-      </p:sp>
-      <p:sp>
-        <p:nvSpPr>
-          <p:cNvPr id="75" name="TextBox 74">
-            <a:extLst>
-              <a:ext uri="{FF2B5EF4-FFF2-40B4-BE49-F238E27FC236}">
-                <a16:creationId xmlns:a16="http://schemas.microsoft.com/office/drawing/2014/main" id="{8AAFE38B-57F0-422E-97FC-63FF403CDFA5}"/>
-              </a:ext>
-            </a:extLst>
-          </p:cNvPr>
-          <p:cNvSpPr txBox="1"/>
-          <p:nvPr/>
-        </p:nvSpPr>
-        <p:spPr>
-          <a:xfrm>
-            <a:off x="53875" y="3562305"/>
-            <a:ext cx="2656179" cy="2308324"/>
-          </a:xfrm>
-          <a:prstGeom prst="rect">
-            <a:avLst/>
-          </a:prstGeom>
-          <a:noFill/>
-        </p:spPr>
-        <p:txBody>
-          <a:bodyPr wrap="square" rtlCol="0">
-            <a:spAutoFit/>
-          </a:bodyPr>
-          <a:lstStyle/>
-          <a:p>
-            <a:r>
-              <a:rPr lang="en-US" dirty="0" err="1"/>
-              <a:t>Checklength</a:t>
-            </a:r>
-            <a:r>
-              <a:rPr lang="en-US" dirty="0"/>
-              <a:t> 2 is the half of the rectangle width</a:t>
-            </a:r>
-          </a:p>
-          <a:p>
-            <a:endParaRPr lang="en-US" dirty="0"/>
-          </a:p>
-          <a:p>
-            <a:r>
-              <a:rPr lang="en-US" dirty="0"/>
-              <a:t>Checklength1 is the hypotenuse of the triangle HOG. – calculate with tan…</a:t>
-            </a:r>
-          </a:p>
-          <a:p>
-            <a:endParaRPr lang="de-DE" dirty="0"/>
-          </a:p>
-        </p:txBody>
-      </p:sp>
-      <p:cxnSp>
-        <p:nvCxnSpPr>
-          <p:cNvPr id="54" name="Straight Connector 53">
-            <a:extLst>
-              <a:ext uri="{FF2B5EF4-FFF2-40B4-BE49-F238E27FC236}">
-                <a16:creationId xmlns:a16="http://schemas.microsoft.com/office/drawing/2014/main" id="{4D941164-754B-49B8-B42F-376D2F26E387}"/>
-              </a:ext>
-            </a:extLst>
-          </p:cNvPr>
-          <p:cNvCxnSpPr>
-            <a:cxnSpLocks/>
-            <a:stCxn id="18" idx="1"/>
-          </p:cNvCxnSpPr>
-          <p:nvPr/>
-        </p:nvCxnSpPr>
-        <p:spPr>
-          <a:xfrm flipH="1" flipV="1">
-            <a:off x="5988657" y="3429002"/>
-            <a:ext cx="848960" cy="1685042"/>
-          </a:xfrm>
-          <a:prstGeom prst="line">
-            <a:avLst/>
-          </a:prstGeom>
-          <a:ln w="76200">
-            <a:solidFill>
-              <a:schemeClr val="bg1">
-                <a:lumMod val="65000"/>
-              </a:schemeClr>
-            </a:solidFill>
-          </a:ln>
-        </p:spPr>
-        <p:style>
-          <a:lnRef idx="1">
-            <a:schemeClr val="accent1"/>
-          </a:lnRef>
-          <a:fillRef idx="0">
-            <a:schemeClr val="accent1"/>
-          </a:fillRef>
-          <a:effectRef idx="0">
-            <a:schemeClr val="accent1"/>
-          </a:effectRef>
-          <a:fontRef idx="minor">
-            <a:schemeClr val="tx1"/>
-          </a:fontRef>
-        </p:style>
-      </p:cxnSp>
-      <p:sp>
-        <p:nvSpPr>
-          <p:cNvPr id="40" name="TextBox 39">
-            <a:extLst>
-              <a:ext uri="{FF2B5EF4-FFF2-40B4-BE49-F238E27FC236}">
-                <a16:creationId xmlns:a16="http://schemas.microsoft.com/office/drawing/2014/main" id="{D70C9EC1-A47A-473B-88A1-7B408CC8BD0F}"/>
-              </a:ext>
-            </a:extLst>
-          </p:cNvPr>
-          <p:cNvSpPr txBox="1"/>
-          <p:nvPr/>
-        </p:nvSpPr>
-        <p:spPr>
-          <a:xfrm>
-            <a:off x="6631807" y="5179184"/>
-            <a:ext cx="351327" cy="369332"/>
-          </a:xfrm>
-          <a:prstGeom prst="rect">
-            <a:avLst/>
-          </a:prstGeom>
-          <a:noFill/>
-        </p:spPr>
-        <p:txBody>
-          <a:bodyPr wrap="square" rtlCol="0">
-            <a:spAutoFit/>
-          </a:bodyPr>
-          <a:lstStyle/>
-          <a:p>
-            <a:r>
-              <a:rPr lang="en-US" dirty="0"/>
-              <a:t>G</a:t>
-            </a:r>
-            <a:endParaRPr lang="de-DE" dirty="0"/>
-          </a:p>
-        </p:txBody>
-      </p:sp>
-      <mc:AlternateContent xmlns:mc="http://schemas.openxmlformats.org/markup-compatibility/2006" xmlns:a14="http://schemas.microsoft.com/office/drawing/2010/main">
-        <mc:Choice Requires="a14">
-          <p:sp>
-            <p:nvSpPr>
-              <p:cNvPr id="42" name="TextBox 41">
-                <a:extLst>
-                  <a:ext uri="{FF2B5EF4-FFF2-40B4-BE49-F238E27FC236}">
-                    <a16:creationId xmlns:a16="http://schemas.microsoft.com/office/drawing/2014/main" id="{DD2B03AC-3975-4CB2-B070-00B0BDFF943C}"/>
-                  </a:ext>
-                </a:extLst>
-              </p:cNvPr>
-              <p:cNvSpPr txBox="1"/>
-              <p:nvPr/>
-            </p:nvSpPr>
-            <p:spPr>
-              <a:xfrm>
-                <a:off x="6359355" y="3523564"/>
-                <a:ext cx="199349" cy="276999"/>
-              </a:xfrm>
-              <a:prstGeom prst="rect">
-                <a:avLst/>
-              </a:prstGeom>
-              <a:noFill/>
-            </p:spPr>
-            <p:txBody>
-              <a:bodyPr wrap="none" lIns="0" tIns="0" rIns="0" bIns="0" rtlCol="0">
-                <a:spAutoFit/>
-              </a:bodyPr>
-              <a:lstStyle/>
-              <a:p>
-                <a:pPr/>
-                <a14:m>
-                  <m:oMathPara xmlns:m="http://schemas.openxmlformats.org/officeDocument/2006/math">
-                    <m:oMathParaPr>
-                      <m:jc m:val="centerGroup"/>
-                    </m:oMathParaPr>
-                    <m:oMath xmlns:m="http://schemas.openxmlformats.org/officeDocument/2006/math">
-                      <m:r>
-                        <a:rPr lang="de-DE" i="1">
-                          <a:latin typeface="Cambria Math" panose="02040503050406030204" pitchFamily="18" charset="0"/>
-                        </a:rPr>
-                        <m:t>𝛽</m:t>
-                      </m:r>
-                    </m:oMath>
-                  </m:oMathPara>
-                </a14:m>
-                <a:endParaRPr lang="de-DE" dirty="0"/>
-              </a:p>
-            </p:txBody>
-          </p:sp>
-        </mc:Choice>
-        <mc:Fallback xmlns="">
-          <p:sp>
-            <p:nvSpPr>
-              <p:cNvPr id="42" name="TextBox 41">
-                <a:extLst>
-                  <a:ext uri="{FF2B5EF4-FFF2-40B4-BE49-F238E27FC236}">
-                    <a16:creationId xmlns:a16="http://schemas.microsoft.com/office/drawing/2014/main" id="{DD2B03AC-3975-4CB2-B070-00B0BDFF943C}"/>
-                  </a:ext>
-                </a:extLst>
-              </p:cNvPr>
-              <p:cNvSpPr txBox="1">
-                <a:spLocks noRot="1" noChangeAspect="1" noMove="1" noResize="1" noEditPoints="1" noAdjustHandles="1" noChangeArrowheads="1" noChangeShapeType="1" noTextEdit="1"/>
-              </p:cNvSpPr>
-              <p:nvPr/>
-            </p:nvSpPr>
-            <p:spPr>
-              <a:xfrm>
-                <a:off x="6359355" y="3523564"/>
-                <a:ext cx="199349" cy="276999"/>
-              </a:xfrm>
-              <a:prstGeom prst="rect">
-                <a:avLst/>
-              </a:prstGeom>
-              <a:blipFill>
-                <a:blip r:embed="rId4"/>
-                <a:stretch>
-                  <a:fillRect l="-42424" t="-2222" r="-36364" b="-35556"/>
-                </a:stretch>
-              </a:blipFill>
-            </p:spPr>
-            <p:txBody>
-              <a:bodyPr/>
-              <a:lstStyle/>
-              <a:p>
-                <a:r>
-                  <a:rPr lang="de-DE">
-                    <a:noFill/>
-                  </a:rPr>
-                  <a:t> </a:t>
-                </a:r>
-              </a:p>
-            </p:txBody>
-          </p:sp>
-        </mc:Fallback>
-      </mc:AlternateContent>
-      <p:sp>
-        <p:nvSpPr>
-          <p:cNvPr id="67" name="TextBox 66">
-            <a:extLst>
-              <a:ext uri="{FF2B5EF4-FFF2-40B4-BE49-F238E27FC236}">
-                <a16:creationId xmlns:a16="http://schemas.microsoft.com/office/drawing/2014/main" id="{DF71909D-7EB1-4ECD-8D01-80ABF86A2AEC}"/>
-              </a:ext>
-            </a:extLst>
-          </p:cNvPr>
-          <p:cNvSpPr txBox="1"/>
-          <p:nvPr/>
-        </p:nvSpPr>
-        <p:spPr>
-          <a:xfrm>
-            <a:off x="10248752" y="3377639"/>
-            <a:ext cx="351327" cy="369332"/>
-          </a:xfrm>
-          <a:prstGeom prst="rect">
-            <a:avLst/>
-          </a:prstGeom>
-          <a:noFill/>
-        </p:spPr>
-        <p:txBody>
-          <a:bodyPr wrap="square" rtlCol="0">
-            <a:spAutoFit/>
-          </a:bodyPr>
-          <a:lstStyle/>
-          <a:p>
-            <a:r>
-              <a:rPr lang="en-US" dirty="0"/>
-              <a:t>H</a:t>
-            </a:r>
-            <a:endParaRPr lang="de-DE" dirty="0"/>
-          </a:p>
-        </p:txBody>
-      </p:sp>
-    </p:spTree>
-    <p:extLst>
-      <p:ext uri="{BB962C8B-B14F-4D97-AF65-F5344CB8AC3E}">
-        <p14:creationId xmlns:p14="http://schemas.microsoft.com/office/powerpoint/2010/main" val="256979469"/>
-      </p:ext>
-    </p:extLst>
-  </p:cSld>
-  <p:clrMapOvr>
-    <a:masterClrMapping/>
-  </p:clrMapOvr>
-</p:sld>
-</file>
-
-<file path=ppt/slides/slide4.xml><?xml version="1.0" encoding="utf-8"?>
 <p:sld xmlns:a="http://schemas.openxmlformats.org/drawingml/2006/main" xmlns:r="http://schemas.openxmlformats.org/officeDocument/2006/relationships" xmlns:p="http://schemas.openxmlformats.org/presentationml/2006/main">
   <p:cSld>
     <p:spTree>
@@ -9291,7 +7492,7 @@
 </p:sld>
 </file>
 
-<file path=ppt/slides/slide5.xml><?xml version="1.0" encoding="utf-8"?>
+<file path=ppt/slides/slide4.xml><?xml version="1.0" encoding="utf-8"?>
 <p:sld xmlns:a="http://schemas.openxmlformats.org/drawingml/2006/main" xmlns:r="http://schemas.openxmlformats.org/officeDocument/2006/relationships" xmlns:p="http://schemas.openxmlformats.org/presentationml/2006/main">
   <p:cSld>
     <p:spTree>
@@ -10860,62 +9061,69 @@
           </a:p>
         </p:txBody>
       </p:sp>
-    </p:spTree>
-    <p:extLst>
-      <p:ext uri="{BB962C8B-B14F-4D97-AF65-F5344CB8AC3E}">
-        <p14:creationId xmlns:p14="http://schemas.microsoft.com/office/powerpoint/2010/main" val="256123038"/>
-      </p:ext>
-    </p:extLst>
-  </p:cSld>
-  <p:clrMapOvr>
-    <a:masterClrMapping/>
-  </p:clrMapOvr>
-</p:sld>
-</file>
-
-<file path=ppt/slides/slide6.xml><?xml version="1.0" encoding="utf-8"?>
-<p:sld xmlns:a="http://schemas.openxmlformats.org/drawingml/2006/main" xmlns:r="http://schemas.openxmlformats.org/officeDocument/2006/relationships" xmlns:p="http://schemas.openxmlformats.org/presentationml/2006/main" show="0">
-  <p:cSld>
-    <p:spTree>
-      <p:nvGrpSpPr>
-        <p:cNvPr id="1" name=""/>
-        <p:cNvGrpSpPr/>
-        <p:nvPr/>
-      </p:nvGrpSpPr>
-      <p:grpSpPr>
-        <a:xfrm>
-          <a:off x="0" y="0"/>
-          <a:ext cx="0" cy="0"/>
-          <a:chOff x="0" y="0"/>
-          <a:chExt cx="0" cy="0"/>
-        </a:xfrm>
-      </p:grpSpPr>
+      <p:sp>
+        <p:nvSpPr>
+          <p:cNvPr id="21" name="TextBox 20">
+            <a:extLst>
+              <a:ext uri="{FF2B5EF4-FFF2-40B4-BE49-F238E27FC236}">
+                <a16:creationId xmlns:a16="http://schemas.microsoft.com/office/drawing/2014/main" id="{9761682D-EF20-4624-B146-A7F40B31A39B}"/>
+              </a:ext>
+            </a:extLst>
+          </p:cNvPr>
+          <p:cNvSpPr txBox="1"/>
+          <p:nvPr/>
+        </p:nvSpPr>
+        <p:spPr>
+          <a:xfrm>
+            <a:off x="306608" y="3726151"/>
+            <a:ext cx="1912530" cy="646331"/>
+          </a:xfrm>
+          <a:prstGeom prst="rect">
+            <a:avLst/>
+          </a:prstGeom>
+          <a:noFill/>
+        </p:spPr>
+        <p:txBody>
+          <a:bodyPr wrap="square" rtlCol="0">
+            <a:spAutoFit/>
+          </a:bodyPr>
+          <a:lstStyle/>
+          <a:p>
+            <a:r>
+              <a:rPr lang="en-US" dirty="0"/>
+              <a:t>Exactly the same triangle as AFB…</a:t>
+            </a:r>
+            <a:endParaRPr lang="de-DE" dirty="0"/>
+          </a:p>
+        </p:txBody>
+      </p:sp>
       <p:cxnSp>
         <p:nvCxnSpPr>
-          <p:cNvPr id="55" name="Straight Connector 54">
-            <a:extLst>
-              <a:ext uri="{FF2B5EF4-FFF2-40B4-BE49-F238E27FC236}">
-                <a16:creationId xmlns:a16="http://schemas.microsoft.com/office/drawing/2014/main" id="{EB5D731A-FACB-4C6F-987B-B95DE3A3DF4C}"/>
+          <p:cNvPr id="23" name="Straight Arrow Connector 22">
+            <a:extLst>
+              <a:ext uri="{FF2B5EF4-FFF2-40B4-BE49-F238E27FC236}">
+                <a16:creationId xmlns:a16="http://schemas.microsoft.com/office/drawing/2014/main" id="{F34083C6-E444-4990-949B-B3843FE13593}"/>
               </a:ext>
             </a:extLst>
           </p:cNvPr>
           <p:cNvCxnSpPr>
-            <a:cxnSpLocks/>
+            <a:stCxn id="21" idx="3"/>
           </p:cNvCxnSpPr>
           <p:nvPr/>
         </p:nvCxnSpPr>
         <p:spPr>
-          <a:xfrm flipH="1" flipV="1">
-            <a:off x="5547360" y="718809"/>
-            <a:ext cx="1072780" cy="5324747"/>
+          <a:xfrm flipV="1">
+            <a:off x="2219138" y="4025502"/>
+            <a:ext cx="1075411" cy="23815"/>
           </a:xfrm>
-          <a:prstGeom prst="line">
+          <a:prstGeom prst="straightConnector1">
             <a:avLst/>
           </a:prstGeom>
           <a:ln w="76200">
             <a:solidFill>
-              <a:srgbClr val="92D050"/>
+              <a:schemeClr val="tx1"/>
             </a:solidFill>
+            <a:tailEnd type="triangle"/>
           </a:ln>
         </p:spPr>
         <p:style>
@@ -10933,6 +9141,36 @@
           </a:fontRef>
         </p:style>
       </p:cxnSp>
+    </p:spTree>
+    <p:extLst>
+      <p:ext uri="{BB962C8B-B14F-4D97-AF65-F5344CB8AC3E}">
+        <p14:creationId xmlns:p14="http://schemas.microsoft.com/office/powerpoint/2010/main" val="256123038"/>
+      </p:ext>
+    </p:extLst>
+  </p:cSld>
+  <p:clrMapOvr>
+    <a:masterClrMapping/>
+  </p:clrMapOvr>
+</p:sld>
+</file>
+
+<file path=ppt/slides/slide5.xml><?xml version="1.0" encoding="utf-8"?>
+<p:sld xmlns:a="http://schemas.openxmlformats.org/drawingml/2006/main" xmlns:r="http://schemas.openxmlformats.org/officeDocument/2006/relationships" xmlns:p="http://schemas.openxmlformats.org/presentationml/2006/main">
+  <p:cSld>
+    <p:spTree>
+      <p:nvGrpSpPr>
+        <p:cNvPr id="1" name=""/>
+        <p:cNvGrpSpPr/>
+        <p:nvPr/>
+      </p:nvGrpSpPr>
+      <p:grpSpPr>
+        <a:xfrm>
+          <a:off x="0" y="0"/>
+          <a:ext cx="0" cy="0"/>
+          <a:chOff x="0" y="0"/>
+          <a:chExt cx="0" cy="0"/>
+        </a:xfrm>
+      </p:grpSpPr>
       <p:grpSp>
         <p:nvGrpSpPr>
           <p:cNvPr id="12" name="Group 11">
@@ -10946,13 +9184,65 @@
           <p:nvPr/>
         </p:nvGrpSpPr>
         <p:grpSpPr>
-          <a:xfrm rot="18766884">
-            <a:off x="3008221" y="219652"/>
-            <a:ext cx="6166698" cy="6219879"/>
-            <a:chOff x="3619459" y="588810"/>
-            <a:chExt cx="4961629" cy="5446462"/>
+          <a:xfrm rot="327097">
+            <a:off x="2815465" y="198502"/>
+            <a:ext cx="6497397" cy="6503789"/>
+            <a:chOff x="3490440" y="887560"/>
+            <a:chExt cx="5227703" cy="5058951"/>
           </a:xfrm>
         </p:grpSpPr>
+        <p:sp>
+          <p:nvSpPr>
+            <p:cNvPr id="42" name="Arc 41">
+              <a:extLst>
+                <a:ext uri="{FF2B5EF4-FFF2-40B4-BE49-F238E27FC236}">
+                  <a16:creationId xmlns:a16="http://schemas.microsoft.com/office/drawing/2014/main" id="{D48DBA63-9209-4DD6-A349-EC1457BE4E63}"/>
+                </a:ext>
+              </a:extLst>
+            </p:cNvPr>
+            <p:cNvSpPr/>
+            <p:nvPr/>
+          </p:nvSpPr>
+          <p:spPr>
+            <a:xfrm rot="2086444">
+              <a:off x="6472408" y="2923507"/>
+              <a:ext cx="599767" cy="816724"/>
+            </a:xfrm>
+            <a:prstGeom prst="arc">
+              <a:avLst>
+                <a:gd name="adj1" fmla="val 16342293"/>
+                <a:gd name="adj2" fmla="val 18807590"/>
+              </a:avLst>
+            </a:prstGeom>
+            <a:ln w="76200">
+              <a:solidFill>
+                <a:srgbClr val="FF0000"/>
+              </a:solidFill>
+            </a:ln>
+          </p:spPr>
+          <p:style>
+            <a:lnRef idx="1">
+              <a:schemeClr val="accent1"/>
+            </a:lnRef>
+            <a:fillRef idx="0">
+              <a:schemeClr val="accent1"/>
+            </a:fillRef>
+            <a:effectRef idx="0">
+              <a:schemeClr val="accent1"/>
+            </a:effectRef>
+            <a:fontRef idx="minor">
+              <a:schemeClr val="tx1"/>
+            </a:fontRef>
+          </p:style>
+          <p:txBody>
+            <a:bodyPr rtlCol="0" anchor="ctr"/>
+            <a:lstStyle/>
+            <a:p>
+              <a:pPr algn="ctr"/>
+              <a:endParaRPr lang="de-DE" dirty="0"/>
+            </a:p>
+          </p:txBody>
+        </p:sp>
         <p:grpSp>
           <p:nvGrpSpPr>
             <p:cNvPr id="3" name="Group 2">
@@ -10967,10 +9257,10 @@
           </p:nvGrpSpPr>
           <p:grpSpPr>
             <a:xfrm>
-              <a:off x="3619459" y="588810"/>
-              <a:ext cx="4961629" cy="5446462"/>
-              <a:chOff x="3619459" y="588810"/>
-              <a:chExt cx="4961629" cy="5446462"/>
+              <a:off x="3490440" y="887560"/>
+              <a:ext cx="5227703" cy="5058951"/>
+              <a:chOff x="3490440" y="887560"/>
+              <a:chExt cx="5227703" cy="5058951"/>
             </a:xfrm>
           </p:grpSpPr>
           <p:grpSp>
@@ -10987,10 +9277,10 @@
             </p:nvGrpSpPr>
             <p:grpSpPr>
               <a:xfrm rot="17570912">
-                <a:off x="3377043" y="831226"/>
-                <a:ext cx="5446462" cy="4961629"/>
-                <a:chOff x="2796318" y="730313"/>
-                <a:chExt cx="5446462" cy="4961629"/>
+                <a:off x="3574816" y="803184"/>
+                <a:ext cx="5058951" cy="5227703"/>
+                <a:chOff x="2894878" y="641748"/>
+                <a:chExt cx="5058951" cy="5227703"/>
               </a:xfrm>
             </p:grpSpPr>
             <p:sp>
@@ -11054,8 +9344,8 @@
                 <p:nvPr/>
               </p:nvSpPr>
               <p:spPr>
-                <a:xfrm rot="6862204">
-                  <a:off x="7876167" y="3552897"/>
+                <a:xfrm rot="3701991">
+                  <a:off x="7587216" y="3446082"/>
                   <a:ext cx="363894" cy="369332"/>
                 </a:xfrm>
                 <a:prstGeom prst="rect">
@@ -11090,8 +9380,8 @@
                 <p:nvPr/>
               </p:nvSpPr>
               <p:spPr>
-                <a:xfrm rot="7213230">
-                  <a:off x="5558287" y="5325329"/>
+                <a:xfrm rot="3425779">
+                  <a:off x="5452557" y="5502838"/>
                   <a:ext cx="363894" cy="369332"/>
                 </a:xfrm>
                 <a:prstGeom prst="rect">
@@ -11126,8 +9416,8 @@
                 <p:nvPr/>
               </p:nvSpPr>
               <p:spPr>
-                <a:xfrm rot="7203660">
-                  <a:off x="2799037" y="2656895"/>
+                <a:xfrm rot="3951213">
+                  <a:off x="2897597" y="2695134"/>
                   <a:ext cx="363894" cy="369332"/>
                 </a:xfrm>
                 <a:prstGeom prst="rect">
@@ -11162,8 +9452,8 @@
                 <p:nvPr/>
               </p:nvSpPr>
               <p:spPr>
-                <a:xfrm rot="6862204">
-                  <a:off x="4981848" y="727594"/>
+                <a:xfrm rot="3701991">
+                  <a:off x="5172623" y="639029"/>
                   <a:ext cx="363894" cy="369332"/>
                 </a:xfrm>
                 <a:prstGeom prst="rect">
@@ -11185,51 +9475,6 @@
                 </a:p>
               </p:txBody>
             </p:sp>
-            <p:cxnSp>
-              <p:nvCxnSpPr>
-                <p:cNvPr id="11" name="Straight Connector 10">
-                  <a:extLst>
-                    <a:ext uri="{FF2B5EF4-FFF2-40B4-BE49-F238E27FC236}">
-                      <a16:creationId xmlns:a16="http://schemas.microsoft.com/office/drawing/2014/main" id="{A47E3499-19DA-4090-B77A-189CEAA0757A}"/>
-                    </a:ext>
-                  </a:extLst>
-                </p:cNvPr>
-                <p:cNvCxnSpPr>
-                  <a:cxnSpLocks/>
-                  <a:stCxn id="24" idx="1"/>
-                  <a:endCxn id="6" idx="1"/>
-                </p:cNvCxnSpPr>
-                <p:nvPr/>
-              </p:nvCxnSpPr>
-              <p:spPr>
-                <a:xfrm rot="6862204" flipV="1">
-                  <a:off x="4798827" y="3709568"/>
-                  <a:ext cx="1744646" cy="1230635"/>
-                </a:xfrm>
-                <a:prstGeom prst="line">
-                  <a:avLst/>
-                </a:prstGeom>
-                <a:ln w="76200">
-                  <a:solidFill>
-                    <a:srgbClr val="92D050"/>
-                  </a:solidFill>
-                </a:ln>
-              </p:spPr>
-              <p:style>
-                <a:lnRef idx="1">
-                  <a:schemeClr val="accent1"/>
-                </a:lnRef>
-                <a:fillRef idx="0">
-                  <a:schemeClr val="accent1"/>
-                </a:fillRef>
-                <a:effectRef idx="0">
-                  <a:schemeClr val="accent1"/>
-                </a:effectRef>
-                <a:fontRef idx="minor">
-                  <a:schemeClr val="tx1"/>
-                </a:fontRef>
-              </p:style>
-            </p:cxnSp>
             <p:sp>
               <p:nvSpPr>
                 <p:cNvPr id="15" name="TextBox 14">
@@ -11243,8 +9488,8 @@
                 <p:nvPr/>
               </p:nvSpPr>
               <p:spPr>
-                <a:xfrm rot="6862204">
-                  <a:off x="5248248" y="2724352"/>
+                <a:xfrm rot="3701991">
+                  <a:off x="5492038" y="2660258"/>
                   <a:ext cx="293135" cy="369332"/>
                 </a:xfrm>
                 <a:prstGeom prst="rect">
@@ -11330,8 +9575,8 @@
                 <p:nvPr/>
               </p:nvSpPr>
               <p:spPr>
-                <a:xfrm rot="926603">
-                  <a:off x="6163685" y="3256535"/>
+                <a:xfrm rot="21296855">
+                  <a:off x="6527688" y="3022992"/>
                   <a:ext cx="531844" cy="369332"/>
                 </a:xfrm>
                 <a:prstGeom prst="rect">
@@ -11382,8 +9627,8 @@
                 <p:nvPr/>
               </p:nvSpPr>
               <p:spPr>
-                <a:xfrm rot="926603">
-                  <a:off x="6163685" y="3256535"/>
+                <a:xfrm rot="21296855">
+                  <a:off x="6527688" y="3022992"/>
                   <a:ext cx="531844" cy="369332"/>
                 </a:xfrm>
                 <a:prstGeom prst="rect">
@@ -11413,349 +9658,71 @@
         </mc:AlternateContent>
         <p:sp>
           <p:nvSpPr>
-            <p:cNvPr id="26" name="Arc 25">
+            <p:cNvPr id="83" name="TextBox 82">
               <a:extLst>
                 <a:ext uri="{FF2B5EF4-FFF2-40B4-BE49-F238E27FC236}">
-                  <a16:creationId xmlns:a16="http://schemas.microsoft.com/office/drawing/2014/main" id="{83778954-2B32-4C49-96F5-CD2E7A7EEDF2}"/>
+                  <a16:creationId xmlns:a16="http://schemas.microsoft.com/office/drawing/2014/main" id="{9D9B4C45-FC4D-4D07-BA4E-A4754DD78662}"/>
                 </a:ext>
               </a:extLst>
             </p:cNvPr>
-            <p:cNvSpPr/>
+            <p:cNvSpPr txBox="1"/>
             <p:nvPr/>
           </p:nvSpPr>
           <p:spPr>
-            <a:xfrm rot="3957672">
-              <a:off x="5537590" y="2833056"/>
-              <a:ext cx="1143556" cy="1119982"/>
+            <a:xfrm rot="926603">
+              <a:off x="7935019" y="3266766"/>
+              <a:ext cx="324702" cy="191522"/>
             </a:xfrm>
-            <a:prstGeom prst="arc">
-              <a:avLst>
-                <a:gd name="adj1" fmla="val 16342293"/>
-                <a:gd name="adj2" fmla="val 20089878"/>
-              </a:avLst>
+            <a:prstGeom prst="rect">
+              <a:avLst/>
             </a:prstGeom>
-            <a:ln w="76200">
-              <a:solidFill>
-                <a:srgbClr val="FF0000"/>
-              </a:solidFill>
-            </a:ln>
+            <a:noFill/>
           </p:spPr>
-          <p:style>
-            <a:lnRef idx="1">
-              <a:schemeClr val="accent1"/>
-            </a:lnRef>
-            <a:fillRef idx="0">
-              <a:schemeClr val="accent1"/>
-            </a:fillRef>
-            <a:effectRef idx="0">
-              <a:schemeClr val="accent1"/>
-            </a:effectRef>
-            <a:fontRef idx="minor">
-              <a:schemeClr val="tx1"/>
-            </a:fontRef>
-          </p:style>
           <p:txBody>
-            <a:bodyPr rtlCol="0" anchor="ctr"/>
+            <a:bodyPr wrap="square" lIns="0" tIns="0" rIns="0" bIns="0" rtlCol="0">
+              <a:spAutoFit/>
+            </a:bodyPr>
             <a:lstStyle/>
             <a:p>
-              <a:pPr algn="ctr"/>
-              <a:endParaRPr lang="de-DE" dirty="0"/>
+              <a:pPr/>
+              <a:endParaRPr lang="de-DE" sz="1600" dirty="0"/>
             </a:p>
           </p:txBody>
         </p:sp>
         <p:sp>
           <p:nvSpPr>
-            <p:cNvPr id="67" name="Arc 66">
+            <p:cNvPr id="100" name="TextBox 99">
               <a:extLst>
                 <a:ext uri="{FF2B5EF4-FFF2-40B4-BE49-F238E27FC236}">
-                  <a16:creationId xmlns:a16="http://schemas.microsoft.com/office/drawing/2014/main" id="{64567379-E6D4-4A7C-A701-E2AFC58B6085}"/>
+                  <a16:creationId xmlns:a16="http://schemas.microsoft.com/office/drawing/2014/main" id="{DC449761-6886-4F7C-9148-2A1A0A96296E}"/>
                 </a:ext>
               </a:extLst>
             </p:cNvPr>
-            <p:cNvSpPr/>
+            <p:cNvSpPr txBox="1"/>
             <p:nvPr/>
           </p:nvSpPr>
           <p:spPr>
-            <a:xfrm rot="4277310">
-              <a:off x="6093399" y="3305887"/>
-              <a:ext cx="891296" cy="1024172"/>
+            <a:xfrm rot="926603">
+              <a:off x="3814660" y="2998838"/>
+              <a:ext cx="324702" cy="191522"/>
             </a:xfrm>
-            <a:prstGeom prst="arc">
-              <a:avLst>
-                <a:gd name="adj1" fmla="val 16110678"/>
-                <a:gd name="adj2" fmla="val 20404259"/>
-              </a:avLst>
+            <a:prstGeom prst="rect">
+              <a:avLst/>
             </a:prstGeom>
-            <a:ln w="76200">
-              <a:solidFill>
-                <a:schemeClr val="accent4"/>
-              </a:solidFill>
-            </a:ln>
+            <a:noFill/>
           </p:spPr>
-          <p:style>
-            <a:lnRef idx="1">
-              <a:schemeClr val="accent1"/>
-            </a:lnRef>
-            <a:fillRef idx="0">
-              <a:schemeClr val="accent1"/>
-            </a:fillRef>
-            <a:effectRef idx="0">
-              <a:schemeClr val="accent1"/>
-            </a:effectRef>
-            <a:fontRef idx="minor">
-              <a:schemeClr val="tx1"/>
-            </a:fontRef>
-          </p:style>
           <p:txBody>
-            <a:bodyPr rtlCol="0" anchor="ctr"/>
+            <a:bodyPr wrap="square" lIns="0" tIns="0" rIns="0" bIns="0" rtlCol="0">
+              <a:spAutoFit/>
+            </a:bodyPr>
             <a:lstStyle/>
             <a:p>
-              <a:pPr algn="ctr"/>
-              <a:endParaRPr lang="de-DE" dirty="0"/>
+              <a:pPr/>
+              <a:endParaRPr lang="de-DE" sz="1600" dirty="0"/>
             </a:p>
           </p:txBody>
         </p:sp>
-        <p:sp>
-          <p:nvSpPr>
-            <p:cNvPr id="93" name="Arc 92">
-              <a:extLst>
-                <a:ext uri="{FF2B5EF4-FFF2-40B4-BE49-F238E27FC236}">
-                  <a16:creationId xmlns:a16="http://schemas.microsoft.com/office/drawing/2014/main" id="{4C6843C9-302B-4914-9171-C1FC6B49F014}"/>
-                </a:ext>
-              </a:extLst>
-            </p:cNvPr>
-            <p:cNvSpPr/>
-            <p:nvPr/>
-          </p:nvSpPr>
-          <p:spPr>
-            <a:xfrm rot="6180966">
-              <a:off x="5462141" y="2586213"/>
-              <a:ext cx="1458334" cy="1515908"/>
-            </a:xfrm>
-            <a:prstGeom prst="arc">
-              <a:avLst>
-                <a:gd name="adj1" fmla="val 16482838"/>
-                <a:gd name="adj2" fmla="val 20089878"/>
-              </a:avLst>
-            </a:prstGeom>
-            <a:ln w="76200">
-              <a:solidFill>
-                <a:srgbClr val="00B0F0"/>
-              </a:solidFill>
-            </a:ln>
-          </p:spPr>
-          <p:style>
-            <a:lnRef idx="1">
-              <a:schemeClr val="accent1"/>
-            </a:lnRef>
-            <a:fillRef idx="0">
-              <a:schemeClr val="accent1"/>
-            </a:fillRef>
-            <a:effectRef idx="0">
-              <a:schemeClr val="accent1"/>
-            </a:effectRef>
-            <a:fontRef idx="minor">
-              <a:schemeClr val="tx1"/>
-            </a:fontRef>
-          </p:style>
-          <p:txBody>
-            <a:bodyPr rtlCol="0" anchor="ctr"/>
-            <a:lstStyle/>
-            <a:p>
-              <a:pPr algn="ctr"/>
-              <a:endParaRPr lang="de-DE" dirty="0"/>
-            </a:p>
-          </p:txBody>
-        </p:sp>
-        <p:sp>
-          <p:nvSpPr>
-            <p:cNvPr id="42" name="Arc 41">
-              <a:extLst>
-                <a:ext uri="{FF2B5EF4-FFF2-40B4-BE49-F238E27FC236}">
-                  <a16:creationId xmlns:a16="http://schemas.microsoft.com/office/drawing/2014/main" id="{D48DBA63-9209-4DD6-A349-EC1457BE4E63}"/>
-                </a:ext>
-              </a:extLst>
-            </p:cNvPr>
-            <p:cNvSpPr/>
-            <p:nvPr/>
-          </p:nvSpPr>
-          <p:spPr>
-            <a:xfrm rot="8794849">
-              <a:off x="5378786" y="2669306"/>
-              <a:ext cx="1050743" cy="1218911"/>
-            </a:xfrm>
-            <a:prstGeom prst="arc">
-              <a:avLst>
-                <a:gd name="adj1" fmla="val 16342293"/>
-                <a:gd name="adj2" fmla="val 20089878"/>
-              </a:avLst>
-            </a:prstGeom>
-            <a:ln w="76200">
-              <a:solidFill>
-                <a:srgbClr val="FF0000"/>
-              </a:solidFill>
-            </a:ln>
-          </p:spPr>
-          <p:style>
-            <a:lnRef idx="1">
-              <a:schemeClr val="accent1"/>
-            </a:lnRef>
-            <a:fillRef idx="0">
-              <a:schemeClr val="accent1"/>
-            </a:fillRef>
-            <a:effectRef idx="0">
-              <a:schemeClr val="accent1"/>
-            </a:effectRef>
-            <a:fontRef idx="minor">
-              <a:schemeClr val="tx1"/>
-            </a:fontRef>
-          </p:style>
-          <p:txBody>
-            <a:bodyPr rtlCol="0" anchor="ctr"/>
-            <a:lstStyle/>
-            <a:p>
-              <a:pPr algn="ctr"/>
-              <a:endParaRPr lang="de-DE" dirty="0"/>
-            </a:p>
-          </p:txBody>
-        </p:sp>
-        <mc:AlternateContent xmlns:mc="http://schemas.openxmlformats.org/markup-compatibility/2006" xmlns:a14="http://schemas.microsoft.com/office/drawing/2010/main">
-          <mc:Choice Requires="a14">
-            <p:sp>
-              <p:nvSpPr>
-                <p:cNvPr id="43" name="TextBox 42">
-                  <a:extLst>
-                    <a:ext uri="{FF2B5EF4-FFF2-40B4-BE49-F238E27FC236}">
-                      <a16:creationId xmlns:a16="http://schemas.microsoft.com/office/drawing/2014/main" id="{C79D7EB1-9BDD-4A4F-A153-ACDD2FFFFC0A}"/>
-                    </a:ext>
-                  </a:extLst>
-                </p:cNvPr>
-                <p:cNvSpPr txBox="1"/>
-                <p:nvPr/>
-              </p:nvSpPr>
-              <p:spPr>
-                <a:xfrm rot="926603">
-                  <a:off x="5692741" y="3541604"/>
-                  <a:ext cx="531844" cy="369332"/>
-                </a:xfrm>
-                <a:prstGeom prst="rect">
-                  <a:avLst/>
-                </a:prstGeom>
-                <a:noFill/>
-              </p:spPr>
-              <p:txBody>
-                <a:bodyPr wrap="square" lIns="0" tIns="0" rIns="0" bIns="0" rtlCol="0">
-                  <a:spAutoFit/>
-                </a:bodyPr>
-                <a:lstStyle/>
-                <a:p>
-                  <a:pPr/>
-                  <a14:m>
-                    <m:oMathPara xmlns:m="http://schemas.openxmlformats.org/officeDocument/2006/math">
-                      <m:oMathParaPr>
-                        <m:jc m:val="centerGroup"/>
-                      </m:oMathParaPr>
-                      <m:oMath xmlns:m="http://schemas.openxmlformats.org/officeDocument/2006/math">
-                        <m:r>
-                          <a:rPr lang="de-DE" sz="2400" smtClean="0">
-                            <a:latin typeface="Cambria Math" panose="02040503050406030204" pitchFamily="18" charset="0"/>
-                          </a:rPr>
-                          <m:t>∝</m:t>
-                        </m:r>
-                      </m:oMath>
-                    </m:oMathPara>
-                  </a14:m>
-                  <a:endParaRPr lang="de-DE" sz="2400" dirty="0"/>
-                </a:p>
-              </p:txBody>
-            </p:sp>
-          </mc:Choice>
-          <mc:Fallback xmlns="">
-            <p:sp>
-              <p:nvSpPr>
-                <p:cNvPr id="43" name="TextBox 42">
-                  <a:extLst>
-                    <a:ext uri="{FF2B5EF4-FFF2-40B4-BE49-F238E27FC236}">
-                      <a16:creationId xmlns:a16="http://schemas.microsoft.com/office/drawing/2014/main" id="{C79D7EB1-9BDD-4A4F-A153-ACDD2FFFFC0A}"/>
-                    </a:ext>
-                  </a:extLst>
-                </p:cNvPr>
-                <p:cNvSpPr txBox="1">
-                  <a:spLocks noRot="1" noChangeAspect="1" noMove="1" noResize="1" noEditPoints="1" noAdjustHandles="1" noChangeArrowheads="1" noChangeShapeType="1" noTextEdit="1"/>
-                </p:cNvSpPr>
-                <p:nvPr/>
-              </p:nvSpPr>
-              <p:spPr>
-                <a:xfrm rot="926603">
-                  <a:off x="5692741" y="3541604"/>
-                  <a:ext cx="531844" cy="369332"/>
-                </a:xfrm>
-                <a:prstGeom prst="rect">
-                  <a:avLst/>
-                </a:prstGeom>
-                <a:blipFill>
-                  <a:blip r:embed="rId3"/>
-                  <a:stretch>
-                    <a:fillRect/>
-                  </a:stretch>
-                </a:blipFill>
-              </p:spPr>
-              <p:txBody>
-                <a:bodyPr/>
-                <a:lstStyle/>
-                <a:p>
-                  <a:r>
-                    <a:rPr lang="de-DE">
-                      <a:noFill/>
-                    </a:rPr>
-                    <a:t> </a:t>
-                  </a:r>
-                </a:p>
-              </p:txBody>
-            </p:sp>
-          </mc:Fallback>
-        </mc:AlternateContent>
       </p:grpSp>
-      <p:cxnSp>
-        <p:nvCxnSpPr>
-          <p:cNvPr id="20" name="Straight Connector 19">
-            <a:extLst>
-              <a:ext uri="{FF2B5EF4-FFF2-40B4-BE49-F238E27FC236}">
-                <a16:creationId xmlns:a16="http://schemas.microsoft.com/office/drawing/2014/main" id="{A127B8B4-2C2D-4516-B714-5843EB6B1799}"/>
-              </a:ext>
-            </a:extLst>
-          </p:cNvPr>
-          <p:cNvCxnSpPr>
-            <a:cxnSpLocks/>
-            <a:endCxn id="6" idx="1"/>
-          </p:cNvCxnSpPr>
-          <p:nvPr/>
-        </p:nvCxnSpPr>
-        <p:spPr>
-          <a:xfrm flipH="1" flipV="1">
-            <a:off x="8365717" y="1897500"/>
-            <a:ext cx="15922" cy="1454495"/>
-          </a:xfrm>
-          <a:prstGeom prst="line">
-            <a:avLst/>
-          </a:prstGeom>
-          <a:ln w="57150"/>
-        </p:spPr>
-        <p:style>
-          <a:lnRef idx="1">
-            <a:schemeClr val="accent1"/>
-          </a:lnRef>
-          <a:fillRef idx="0">
-            <a:schemeClr val="accent1"/>
-          </a:fillRef>
-          <a:effectRef idx="0">
-            <a:schemeClr val="accent1"/>
-          </a:effectRef>
-          <a:fontRef idx="minor">
-            <a:schemeClr val="tx1"/>
-          </a:fontRef>
-        </p:style>
-      </p:cxnSp>
       <p:grpSp>
         <p:nvGrpSpPr>
           <p:cNvPr id="37" name="Group 36">
@@ -11954,7 +9921,7 @@
         <p:spPr>
           <a:xfrm>
             <a:off x="277808" y="203288"/>
-            <a:ext cx="2052320" cy="646331"/>
+            <a:ext cx="2052320" cy="369332"/>
           </a:xfrm>
           <a:prstGeom prst="rect">
             <a:avLst/>
@@ -11969,7 +9936,7 @@
           <a:p>
             <a:r>
               <a:rPr lang="en-US" dirty="0"/>
-              <a:t>Calculating the B,D Positions</a:t>
+              <a:t>Fill the rectangle</a:t>
             </a:r>
             <a:endParaRPr lang="de-DE" dirty="0"/>
           </a:p>
@@ -12052,7 +10019,7 @@
                 <a:avLst/>
               </a:prstGeom>
               <a:blipFill>
-                <a:blip r:embed="rId4"/>
+                <a:blip r:embed="rId5"/>
                 <a:stretch>
                   <a:fillRect l="-2466" t="-4717" b="-14151"/>
                 </a:stretch>
@@ -12073,796 +10040,6 @@
           </p:sp>
         </mc:Fallback>
       </mc:AlternateContent>
-      <p:sp>
-        <p:nvSpPr>
-          <p:cNvPr id="14" name="TextBox 13">
-            <a:extLst>
-              <a:ext uri="{FF2B5EF4-FFF2-40B4-BE49-F238E27FC236}">
-                <a16:creationId xmlns:a16="http://schemas.microsoft.com/office/drawing/2014/main" id="{01928106-E4FD-4CE2-958C-09F0B5ECB98C}"/>
-              </a:ext>
-            </a:extLst>
-          </p:cNvPr>
-          <p:cNvSpPr txBox="1"/>
-          <p:nvPr/>
-        </p:nvSpPr>
-        <p:spPr>
-          <a:xfrm>
-            <a:off x="7241940" y="2838268"/>
-            <a:ext cx="284480" cy="369332"/>
-          </a:xfrm>
-          <a:prstGeom prst="rect">
-            <a:avLst/>
-          </a:prstGeom>
-          <a:noFill/>
-        </p:spPr>
-        <p:txBody>
-          <a:bodyPr wrap="square" rtlCol="0">
-            <a:spAutoFit/>
-          </a:bodyPr>
-          <a:lstStyle/>
-          <a:p>
-            <a:r>
-              <a:rPr lang="el-GR" b="1" i="0" dirty="0">
-                <a:solidFill>
-                  <a:srgbClr val="202122"/>
-                </a:solidFill>
-                <a:effectLst/>
-                <a:latin typeface="SBL BibLit"/>
-              </a:rPr>
-              <a:t>γ</a:t>
-            </a:r>
-            <a:endParaRPr lang="de-DE" dirty="0"/>
-          </a:p>
-        </p:txBody>
-      </p:sp>
-      <p:grpSp>
-        <p:nvGrpSpPr>
-          <p:cNvPr id="105" name="Group 104">
-            <a:extLst>
-              <a:ext uri="{FF2B5EF4-FFF2-40B4-BE49-F238E27FC236}">
-                <a16:creationId xmlns:a16="http://schemas.microsoft.com/office/drawing/2014/main" id="{5AE16573-1B49-4C81-99E7-539DD6A51132}"/>
-              </a:ext>
-            </a:extLst>
-          </p:cNvPr>
-          <p:cNvGrpSpPr/>
-          <p:nvPr/>
-        </p:nvGrpSpPr>
-        <p:grpSpPr>
-          <a:xfrm rot="16200000">
-            <a:off x="8078138" y="3094791"/>
-            <a:ext cx="259903" cy="260410"/>
-            <a:chOff x="7598912" y="3063861"/>
-            <a:chExt cx="259903" cy="260410"/>
-          </a:xfrm>
-        </p:grpSpPr>
-        <p:cxnSp>
-          <p:nvCxnSpPr>
-            <p:cNvPr id="69" name="Straight Connector 68">
-              <a:extLst>
-                <a:ext uri="{FF2B5EF4-FFF2-40B4-BE49-F238E27FC236}">
-                  <a16:creationId xmlns:a16="http://schemas.microsoft.com/office/drawing/2014/main" id="{E8B9EFA2-4063-4D4F-8A00-F7A6AEBF42D6}"/>
-                </a:ext>
-              </a:extLst>
-            </p:cNvPr>
-            <p:cNvCxnSpPr>
-              <a:cxnSpLocks/>
-            </p:cNvCxnSpPr>
-            <p:nvPr/>
-          </p:nvCxnSpPr>
-          <p:spPr>
-            <a:xfrm flipH="1" flipV="1">
-              <a:off x="7851498" y="3068749"/>
-              <a:ext cx="7317" cy="255522"/>
-            </a:xfrm>
-            <a:prstGeom prst="line">
-              <a:avLst/>
-            </a:prstGeom>
-            <a:ln w="38100">
-              <a:solidFill>
-                <a:srgbClr val="FF0000"/>
-              </a:solidFill>
-            </a:ln>
-          </p:spPr>
-          <p:style>
-            <a:lnRef idx="1">
-              <a:schemeClr val="accent1"/>
-            </a:lnRef>
-            <a:fillRef idx="0">
-              <a:schemeClr val="accent1"/>
-            </a:fillRef>
-            <a:effectRef idx="0">
-              <a:schemeClr val="accent1"/>
-            </a:effectRef>
-            <a:fontRef idx="minor">
-              <a:schemeClr val="tx1"/>
-            </a:fontRef>
-          </p:style>
-        </p:cxnSp>
-        <p:cxnSp>
-          <p:nvCxnSpPr>
-            <p:cNvPr id="70" name="Straight Connector 69">
-              <a:extLst>
-                <a:ext uri="{FF2B5EF4-FFF2-40B4-BE49-F238E27FC236}">
-                  <a16:creationId xmlns:a16="http://schemas.microsoft.com/office/drawing/2014/main" id="{812F1563-E698-4822-B1C3-FB30D1B4F3B3}"/>
-                </a:ext>
-              </a:extLst>
-            </p:cNvPr>
-            <p:cNvCxnSpPr>
-              <a:cxnSpLocks/>
-            </p:cNvCxnSpPr>
-            <p:nvPr/>
-          </p:nvCxnSpPr>
-          <p:spPr>
-            <a:xfrm rot="16200000" flipV="1">
-              <a:off x="7726945" y="2935828"/>
-              <a:ext cx="2" cy="256068"/>
-            </a:xfrm>
-            <a:prstGeom prst="line">
-              <a:avLst/>
-            </a:prstGeom>
-            <a:ln w="38100">
-              <a:solidFill>
-                <a:srgbClr val="FF0000"/>
-              </a:solidFill>
-            </a:ln>
-          </p:spPr>
-          <p:style>
-            <a:lnRef idx="1">
-              <a:schemeClr val="accent1"/>
-            </a:lnRef>
-            <a:fillRef idx="0">
-              <a:schemeClr val="accent1"/>
-            </a:fillRef>
-            <a:effectRef idx="0">
-              <a:schemeClr val="accent1"/>
-            </a:effectRef>
-            <a:fontRef idx="minor">
-              <a:schemeClr val="tx1"/>
-            </a:fontRef>
-          </p:style>
-        </p:cxnSp>
-      </p:grpSp>
-      <p:sp>
-        <p:nvSpPr>
-          <p:cNvPr id="75" name="TextBox 74">
-            <a:extLst>
-              <a:ext uri="{FF2B5EF4-FFF2-40B4-BE49-F238E27FC236}">
-                <a16:creationId xmlns:a16="http://schemas.microsoft.com/office/drawing/2014/main" id="{7CC29990-3876-4283-BA73-A8ADA960A648}"/>
-              </a:ext>
-            </a:extLst>
-          </p:cNvPr>
-          <p:cNvSpPr txBox="1"/>
-          <p:nvPr/>
-        </p:nvSpPr>
-        <p:spPr>
-          <a:xfrm>
-            <a:off x="126368" y="4744499"/>
-            <a:ext cx="2928531" cy="1200329"/>
-          </a:xfrm>
-          <a:prstGeom prst="rect">
-            <a:avLst/>
-          </a:prstGeom>
-          <a:noFill/>
-        </p:spPr>
-        <p:txBody>
-          <a:bodyPr wrap="square" rtlCol="0">
-            <a:spAutoFit/>
-          </a:bodyPr>
-          <a:lstStyle/>
-          <a:p>
-            <a:r>
-              <a:rPr lang="el-GR" b="1" i="0" dirty="0">
-                <a:solidFill>
-                  <a:srgbClr val="202122"/>
-                </a:solidFill>
-                <a:effectLst/>
-                <a:latin typeface="SBL BibLit"/>
-              </a:rPr>
-              <a:t>γ</a:t>
-            </a:r>
-            <a:r>
-              <a:rPr lang="de-DE" b="1" i="0" dirty="0">
-                <a:solidFill>
-                  <a:srgbClr val="202122"/>
-                </a:solidFill>
-                <a:effectLst/>
-                <a:latin typeface="SBL BibLit"/>
-              </a:rPr>
-              <a:t> (</a:t>
-            </a:r>
-            <a:r>
-              <a:rPr lang="de-DE" b="1" i="0" dirty="0" err="1">
-                <a:solidFill>
-                  <a:srgbClr val="202122"/>
-                </a:solidFill>
-                <a:effectLst/>
-                <a:latin typeface="SBL BibLit"/>
-              </a:rPr>
-              <a:t>gamma</a:t>
-            </a:r>
-            <a:r>
-              <a:rPr lang="de-DE" b="1" i="0" dirty="0">
-                <a:solidFill>
-                  <a:srgbClr val="202122"/>
-                </a:solidFill>
-                <a:effectLst/>
-                <a:latin typeface="SBL BibLit"/>
-              </a:rPr>
-              <a:t>)=</a:t>
-            </a:r>
-            <a:r>
-              <a:rPr lang="en-US" dirty="0"/>
-              <a:t>Angle to calculate with the rectangle </a:t>
-            </a:r>
-            <a:r>
-              <a:rPr lang="en-US" u="sng" dirty="0"/>
-              <a:t>OIA</a:t>
-            </a:r>
-            <a:r>
-              <a:rPr lang="en-US" dirty="0"/>
-              <a:t> in order to calculate the position B</a:t>
-            </a:r>
-            <a:endParaRPr lang="de-DE" dirty="0"/>
-          </a:p>
-        </p:txBody>
-      </p:sp>
-      <p:sp>
-        <p:nvSpPr>
-          <p:cNvPr id="91" name="TextBox 90">
-            <a:extLst>
-              <a:ext uri="{FF2B5EF4-FFF2-40B4-BE49-F238E27FC236}">
-                <a16:creationId xmlns:a16="http://schemas.microsoft.com/office/drawing/2014/main" id="{E2DFC87E-3CCF-4E8F-B0F8-113B98A34A65}"/>
-              </a:ext>
-            </a:extLst>
-          </p:cNvPr>
-          <p:cNvSpPr txBox="1"/>
-          <p:nvPr/>
-        </p:nvSpPr>
-        <p:spPr>
-          <a:xfrm>
-            <a:off x="6914527" y="3041020"/>
-            <a:ext cx="346787" cy="400110"/>
-          </a:xfrm>
-          <a:prstGeom prst="rect">
-            <a:avLst/>
-          </a:prstGeom>
-          <a:noFill/>
-        </p:spPr>
-        <p:txBody>
-          <a:bodyPr wrap="square" rtlCol="0">
-            <a:spAutoFit/>
-          </a:bodyPr>
-          <a:lstStyle/>
-          <a:p>
-            <a:r>
-              <a:rPr lang="el-GR" sz="2000" b="1" i="0" dirty="0">
-                <a:effectLst/>
-                <a:latin typeface="arial" panose="020B0604020202020204" pitchFamily="34" charset="0"/>
-              </a:rPr>
-              <a:t>δ</a:t>
-            </a:r>
-            <a:endParaRPr lang="de-DE" sz="2000" dirty="0"/>
-          </a:p>
-        </p:txBody>
-      </p:sp>
-      <p:sp>
-        <p:nvSpPr>
-          <p:cNvPr id="94" name="TextBox 93">
-            <a:extLst>
-              <a:ext uri="{FF2B5EF4-FFF2-40B4-BE49-F238E27FC236}">
-                <a16:creationId xmlns:a16="http://schemas.microsoft.com/office/drawing/2014/main" id="{D1F95103-FED3-4370-A2B4-CA83345DDBBC}"/>
-              </a:ext>
-            </a:extLst>
-          </p:cNvPr>
-          <p:cNvSpPr txBox="1"/>
-          <p:nvPr/>
-        </p:nvSpPr>
-        <p:spPr>
-          <a:xfrm>
-            <a:off x="23549" y="3723476"/>
-            <a:ext cx="3259976" cy="923330"/>
-          </a:xfrm>
-          <a:prstGeom prst="rect">
-            <a:avLst/>
-          </a:prstGeom>
-          <a:noFill/>
-        </p:spPr>
-        <p:txBody>
-          <a:bodyPr wrap="square" rtlCol="0">
-            <a:spAutoFit/>
-          </a:bodyPr>
-          <a:lstStyle/>
-          <a:p>
-            <a:r>
-              <a:rPr lang="el-GR" sz="1800" b="1" i="0" dirty="0">
-                <a:effectLst/>
-                <a:latin typeface="arial" panose="020B0604020202020204" pitchFamily="34" charset="0"/>
-              </a:rPr>
-              <a:t>δ</a:t>
-            </a:r>
-            <a:r>
-              <a:rPr lang="de-DE" b="1" i="0" dirty="0">
-                <a:solidFill>
-                  <a:srgbClr val="202122"/>
-                </a:solidFill>
-                <a:effectLst/>
-                <a:latin typeface="SBL BibLit"/>
-              </a:rPr>
-              <a:t> (</a:t>
-            </a:r>
-            <a:r>
-              <a:rPr lang="de-DE" b="1" i="0" dirty="0" err="1">
-                <a:solidFill>
-                  <a:srgbClr val="202122"/>
-                </a:solidFill>
-                <a:effectLst/>
-                <a:latin typeface="SBL BibLit"/>
-              </a:rPr>
-              <a:t>delta</a:t>
-            </a:r>
-            <a:r>
-              <a:rPr lang="de-DE" b="1" i="0" dirty="0">
-                <a:solidFill>
-                  <a:srgbClr val="202122"/>
-                </a:solidFill>
-                <a:effectLst/>
-                <a:latin typeface="SBL BibLit"/>
-              </a:rPr>
-              <a:t>)</a:t>
-            </a:r>
-            <a:r>
-              <a:rPr lang="de-DE" i="0" dirty="0">
-                <a:solidFill>
-                  <a:srgbClr val="202122"/>
-                </a:solidFill>
-                <a:effectLst/>
-                <a:latin typeface="SBL BibLit"/>
-              </a:rPr>
-              <a:t>=</a:t>
-            </a:r>
-            <a:r>
-              <a:rPr lang="de-DE" i="0" dirty="0" err="1">
-                <a:solidFill>
-                  <a:srgbClr val="202122"/>
-                </a:solidFill>
-                <a:effectLst/>
-                <a:latin typeface="SBL BibLit"/>
-              </a:rPr>
-              <a:t>the</a:t>
-            </a:r>
-            <a:r>
-              <a:rPr lang="de-DE" i="0" dirty="0">
-                <a:solidFill>
-                  <a:srgbClr val="202122"/>
-                </a:solidFill>
-                <a:effectLst/>
-                <a:latin typeface="SBL BibLit"/>
-              </a:rPr>
-              <a:t> angle </a:t>
-            </a:r>
-            <a:r>
-              <a:rPr lang="de-DE" i="0" dirty="0" err="1">
-                <a:solidFill>
-                  <a:srgbClr val="202122"/>
-                </a:solidFill>
-                <a:effectLst/>
-                <a:latin typeface="SBL BibLit"/>
-              </a:rPr>
-              <a:t>we</a:t>
-            </a:r>
-            <a:r>
-              <a:rPr lang="de-DE" i="0" dirty="0">
-                <a:solidFill>
-                  <a:srgbClr val="202122"/>
-                </a:solidFill>
-                <a:effectLst/>
-                <a:latin typeface="SBL BibLit"/>
-              </a:rPr>
-              <a:t> </a:t>
-            </a:r>
-            <a:r>
-              <a:rPr lang="de-DE" i="0" dirty="0" err="1">
-                <a:solidFill>
-                  <a:srgbClr val="202122"/>
-                </a:solidFill>
-                <a:effectLst/>
-                <a:latin typeface="SBL BibLit"/>
-              </a:rPr>
-              <a:t>need</a:t>
-            </a:r>
-            <a:r>
-              <a:rPr lang="de-DE" i="0" dirty="0">
-                <a:solidFill>
-                  <a:srgbClr val="202122"/>
-                </a:solidFill>
-                <a:effectLst/>
-                <a:latin typeface="SBL BibLit"/>
-              </a:rPr>
-              <a:t> </a:t>
-            </a:r>
-            <a:r>
-              <a:rPr lang="de-DE" i="0" dirty="0" err="1">
-                <a:solidFill>
-                  <a:srgbClr val="202122"/>
-                </a:solidFill>
-                <a:effectLst/>
-                <a:latin typeface="SBL BibLit"/>
-              </a:rPr>
-              <a:t>to</a:t>
-            </a:r>
-            <a:r>
-              <a:rPr lang="de-DE" i="0" dirty="0">
-                <a:solidFill>
-                  <a:srgbClr val="202122"/>
-                </a:solidFill>
-                <a:effectLst/>
-                <a:latin typeface="SBL BibLit"/>
-              </a:rPr>
-              <a:t> </a:t>
-            </a:r>
-            <a:r>
-              <a:rPr lang="de-DE" i="0" dirty="0" err="1">
-                <a:solidFill>
-                  <a:srgbClr val="202122"/>
-                </a:solidFill>
-                <a:effectLst/>
-                <a:latin typeface="SBL BibLit"/>
-              </a:rPr>
-              <a:t>calculate</a:t>
-            </a:r>
-            <a:r>
-              <a:rPr lang="de-DE" i="0" dirty="0">
-                <a:solidFill>
-                  <a:srgbClr val="202122"/>
-                </a:solidFill>
-                <a:effectLst/>
-                <a:latin typeface="SBL BibLit"/>
-              </a:rPr>
-              <a:t> </a:t>
-            </a:r>
-            <a:r>
-              <a:rPr lang="de-DE" i="0" dirty="0" err="1">
-                <a:solidFill>
-                  <a:srgbClr val="202122"/>
-                </a:solidFill>
-                <a:effectLst/>
-                <a:latin typeface="SBL BibLit"/>
-              </a:rPr>
-              <a:t>with</a:t>
-            </a:r>
-            <a:r>
-              <a:rPr lang="de-DE" i="0" dirty="0">
-                <a:solidFill>
-                  <a:srgbClr val="202122"/>
-                </a:solidFill>
-                <a:effectLst/>
-                <a:latin typeface="SBL BibLit"/>
-              </a:rPr>
-              <a:t> </a:t>
-            </a:r>
-            <a:r>
-              <a:rPr lang="de-DE" i="0" dirty="0" err="1">
-                <a:solidFill>
-                  <a:srgbClr val="202122"/>
-                </a:solidFill>
-                <a:effectLst/>
-                <a:latin typeface="SBL BibLit"/>
-              </a:rPr>
-              <a:t>the</a:t>
-            </a:r>
-            <a:r>
-              <a:rPr lang="de-DE" i="0" dirty="0">
-                <a:solidFill>
-                  <a:srgbClr val="202122"/>
-                </a:solidFill>
-                <a:effectLst/>
-                <a:latin typeface="SBL BibLit"/>
-              </a:rPr>
-              <a:t> </a:t>
-            </a:r>
-            <a:r>
-              <a:rPr lang="de-DE" i="0" dirty="0" err="1">
-                <a:solidFill>
-                  <a:srgbClr val="202122"/>
-                </a:solidFill>
-                <a:effectLst/>
-                <a:latin typeface="SBL BibLit"/>
-              </a:rPr>
-              <a:t>rectangle</a:t>
-            </a:r>
-            <a:r>
-              <a:rPr lang="de-DE" i="0" dirty="0">
-                <a:solidFill>
-                  <a:srgbClr val="202122"/>
-                </a:solidFill>
-                <a:effectLst/>
-                <a:latin typeface="SBL BibLit"/>
-              </a:rPr>
-              <a:t> </a:t>
-            </a:r>
-            <a:r>
-              <a:rPr lang="de-DE" i="0" u="sng" dirty="0">
-                <a:solidFill>
-                  <a:srgbClr val="202122"/>
-                </a:solidFill>
-                <a:effectLst/>
-                <a:latin typeface="SBL BibLit"/>
-              </a:rPr>
-              <a:t>OFA</a:t>
-            </a:r>
-            <a:r>
-              <a:rPr lang="de-DE" i="0" dirty="0">
-                <a:solidFill>
-                  <a:srgbClr val="202122"/>
-                </a:solidFill>
-                <a:effectLst/>
-                <a:latin typeface="SBL BibLit"/>
-              </a:rPr>
-              <a:t> </a:t>
-            </a:r>
-            <a:r>
-              <a:rPr lang="de-DE" i="0" dirty="0" err="1">
-                <a:solidFill>
-                  <a:srgbClr val="202122"/>
-                </a:solidFill>
-                <a:effectLst/>
-                <a:latin typeface="SBL BibLit"/>
-              </a:rPr>
-              <a:t>to</a:t>
-            </a:r>
-            <a:r>
-              <a:rPr lang="de-DE" i="0" dirty="0">
-                <a:solidFill>
-                  <a:srgbClr val="202122"/>
-                </a:solidFill>
-                <a:effectLst/>
-                <a:latin typeface="SBL BibLit"/>
-              </a:rPr>
-              <a:t> </a:t>
-            </a:r>
-            <a:r>
-              <a:rPr lang="de-DE" i="0" dirty="0" err="1">
-                <a:solidFill>
-                  <a:srgbClr val="202122"/>
-                </a:solidFill>
-                <a:effectLst/>
-                <a:latin typeface="SBL BibLit"/>
-              </a:rPr>
-              <a:t>get</a:t>
-            </a:r>
-            <a:r>
-              <a:rPr lang="de-DE" i="0" dirty="0">
-                <a:solidFill>
-                  <a:srgbClr val="202122"/>
-                </a:solidFill>
-                <a:effectLst/>
-                <a:latin typeface="SBL BibLit"/>
-              </a:rPr>
-              <a:t> </a:t>
-            </a:r>
-            <a:r>
-              <a:rPr lang="de-DE" i="0" dirty="0" err="1">
-                <a:solidFill>
-                  <a:srgbClr val="202122"/>
-                </a:solidFill>
-                <a:effectLst/>
-                <a:latin typeface="SBL BibLit"/>
-              </a:rPr>
-              <a:t>afterwards</a:t>
-            </a:r>
-            <a:r>
-              <a:rPr lang="de-DE" i="0" dirty="0">
-                <a:solidFill>
-                  <a:srgbClr val="202122"/>
-                </a:solidFill>
-                <a:effectLst/>
-                <a:latin typeface="SBL BibLit"/>
-              </a:rPr>
-              <a:t> angle </a:t>
-            </a:r>
-            <a:r>
-              <a:rPr lang="el-GR" b="1" i="0" dirty="0">
-                <a:solidFill>
-                  <a:srgbClr val="202122"/>
-                </a:solidFill>
-                <a:effectLst/>
-                <a:latin typeface="SBL BibLit"/>
-              </a:rPr>
-              <a:t>γ</a:t>
-            </a:r>
-            <a:r>
-              <a:rPr lang="de-DE" b="1" i="0" dirty="0">
-                <a:solidFill>
-                  <a:srgbClr val="202122"/>
-                </a:solidFill>
-                <a:effectLst/>
-                <a:latin typeface="SBL BibLit"/>
-              </a:rPr>
-              <a:t>.</a:t>
-            </a:r>
-            <a:endParaRPr lang="de-DE" dirty="0"/>
-          </a:p>
-        </p:txBody>
-      </p:sp>
-      <p:sp>
-        <p:nvSpPr>
-          <p:cNvPr id="95" name="TextBox 94">
-            <a:extLst>
-              <a:ext uri="{FF2B5EF4-FFF2-40B4-BE49-F238E27FC236}">
-                <a16:creationId xmlns:a16="http://schemas.microsoft.com/office/drawing/2014/main" id="{E02EAC88-E773-4415-8BE6-D9BEA95A25E2}"/>
-              </a:ext>
-            </a:extLst>
-          </p:cNvPr>
-          <p:cNvSpPr txBox="1"/>
-          <p:nvPr/>
-        </p:nvSpPr>
-        <p:spPr>
-          <a:xfrm>
-            <a:off x="7488425" y="3915851"/>
-            <a:ext cx="305761" cy="379613"/>
-          </a:xfrm>
-          <a:prstGeom prst="rect">
-            <a:avLst/>
-          </a:prstGeom>
-          <a:noFill/>
-        </p:spPr>
-        <p:txBody>
-          <a:bodyPr wrap="square" rtlCol="0">
-            <a:spAutoFit/>
-          </a:bodyPr>
-          <a:lstStyle/>
-          <a:p>
-            <a:r>
-              <a:rPr lang="en-US" dirty="0"/>
-              <a:t>F</a:t>
-            </a:r>
-            <a:endParaRPr lang="de-DE" dirty="0"/>
-          </a:p>
-        </p:txBody>
-      </p:sp>
-      <p:sp>
-        <p:nvSpPr>
-          <p:cNvPr id="96" name="TextBox 95">
-            <a:extLst>
-              <a:ext uri="{FF2B5EF4-FFF2-40B4-BE49-F238E27FC236}">
-                <a16:creationId xmlns:a16="http://schemas.microsoft.com/office/drawing/2014/main" id="{9913546B-BB45-4690-A06C-E31B587367EC}"/>
-              </a:ext>
-            </a:extLst>
-          </p:cNvPr>
-          <p:cNvSpPr txBox="1"/>
-          <p:nvPr/>
-        </p:nvSpPr>
-        <p:spPr>
-          <a:xfrm>
-            <a:off x="8271175" y="3463604"/>
-            <a:ext cx="305761" cy="379613"/>
-          </a:xfrm>
-          <a:prstGeom prst="rect">
-            <a:avLst/>
-          </a:prstGeom>
-          <a:noFill/>
-        </p:spPr>
-        <p:txBody>
-          <a:bodyPr wrap="square" rtlCol="0">
-            <a:spAutoFit/>
-          </a:bodyPr>
-          <a:lstStyle/>
-          <a:p>
-            <a:r>
-              <a:rPr lang="en-US" dirty="0"/>
-              <a:t>I</a:t>
-            </a:r>
-            <a:endParaRPr lang="de-DE" dirty="0"/>
-          </a:p>
-        </p:txBody>
-      </p:sp>
-      <p:grpSp>
-        <p:nvGrpSpPr>
-          <p:cNvPr id="13" name="Group 12">
-            <a:extLst>
-              <a:ext uri="{FF2B5EF4-FFF2-40B4-BE49-F238E27FC236}">
-                <a16:creationId xmlns:a16="http://schemas.microsoft.com/office/drawing/2014/main" id="{E1B60CF1-18AA-45FD-A6D6-6562C98039DE}"/>
-              </a:ext>
-            </a:extLst>
-          </p:cNvPr>
-          <p:cNvGrpSpPr/>
-          <p:nvPr/>
-        </p:nvGrpSpPr>
-        <p:grpSpPr>
-          <a:xfrm rot="2314631">
-            <a:off x="7293891" y="3610457"/>
-            <a:ext cx="220542" cy="273711"/>
-            <a:chOff x="7690652" y="2280931"/>
-            <a:chExt cx="220542" cy="273711"/>
-          </a:xfrm>
-        </p:grpSpPr>
-        <p:cxnSp>
-          <p:nvCxnSpPr>
-            <p:cNvPr id="97" name="Straight Connector 96">
-              <a:extLst>
-                <a:ext uri="{FF2B5EF4-FFF2-40B4-BE49-F238E27FC236}">
-                  <a16:creationId xmlns:a16="http://schemas.microsoft.com/office/drawing/2014/main" id="{E7AE52A4-774C-4236-98CA-F830252734D1}"/>
-                </a:ext>
-              </a:extLst>
-            </p:cNvPr>
-            <p:cNvCxnSpPr>
-              <a:cxnSpLocks/>
-            </p:cNvCxnSpPr>
-            <p:nvPr/>
-          </p:nvCxnSpPr>
-          <p:spPr>
-            <a:xfrm rot="18498647" flipV="1">
-              <a:off x="7700466" y="2416587"/>
-              <a:ext cx="128241" cy="147870"/>
-            </a:xfrm>
-            <a:prstGeom prst="line">
-              <a:avLst/>
-            </a:prstGeom>
-            <a:ln w="38100">
-              <a:solidFill>
-                <a:srgbClr val="FF0000"/>
-              </a:solidFill>
-            </a:ln>
-          </p:spPr>
-          <p:style>
-            <a:lnRef idx="1">
-              <a:schemeClr val="accent1"/>
-            </a:lnRef>
-            <a:fillRef idx="0">
-              <a:schemeClr val="accent1"/>
-            </a:fillRef>
-            <a:effectRef idx="0">
-              <a:schemeClr val="accent1"/>
-            </a:effectRef>
-            <a:fontRef idx="minor">
-              <a:schemeClr val="tx1"/>
-            </a:fontRef>
-          </p:style>
-        </p:cxnSp>
-        <p:cxnSp>
-          <p:nvCxnSpPr>
-            <p:cNvPr id="98" name="Straight Connector 97">
-              <a:extLst>
-                <a:ext uri="{FF2B5EF4-FFF2-40B4-BE49-F238E27FC236}">
-                  <a16:creationId xmlns:a16="http://schemas.microsoft.com/office/drawing/2014/main" id="{90131B78-0D62-465A-8B1F-0CCBBBD1E1DA}"/>
-                </a:ext>
-              </a:extLst>
-            </p:cNvPr>
-            <p:cNvCxnSpPr>
-              <a:cxnSpLocks/>
-            </p:cNvCxnSpPr>
-            <p:nvPr/>
-          </p:nvCxnSpPr>
-          <p:spPr>
-            <a:xfrm rot="18498647">
-              <a:off x="7753464" y="2293477"/>
-              <a:ext cx="170276" cy="145184"/>
-            </a:xfrm>
-            <a:prstGeom prst="line">
-              <a:avLst/>
-            </a:prstGeom>
-            <a:ln w="38100">
-              <a:solidFill>
-                <a:srgbClr val="FF0000"/>
-              </a:solidFill>
-            </a:ln>
-          </p:spPr>
-          <p:style>
-            <a:lnRef idx="1">
-              <a:schemeClr val="accent1"/>
-            </a:lnRef>
-            <a:fillRef idx="0">
-              <a:schemeClr val="accent1"/>
-            </a:fillRef>
-            <a:effectRef idx="0">
-              <a:schemeClr val="accent1"/>
-            </a:effectRef>
-            <a:fontRef idx="minor">
-              <a:schemeClr val="tx1"/>
-            </a:fontRef>
-          </p:style>
-        </p:cxnSp>
-      </p:grpSp>
       <p:cxnSp>
         <p:nvCxnSpPr>
           <p:cNvPr id="39" name="Straight Connector 38">
@@ -12881,8 +10058,8 @@
         </p:nvCxnSpPr>
         <p:spPr>
           <a:xfrm flipH="1" flipV="1">
-            <a:off x="4673234" y="2785623"/>
-            <a:ext cx="2819131" cy="1190110"/>
+            <a:off x="5593189" y="1676751"/>
+            <a:ext cx="859166" cy="3335955"/>
           </a:xfrm>
           <a:prstGeom prst="line">
             <a:avLst/>
@@ -12910,10 +10087,388 @@
           </a:fontRef>
         </p:style>
       </p:cxnSp>
+      <p:sp>
+        <p:nvSpPr>
+          <p:cNvPr id="21" name="TextBox 20">
+            <a:extLst>
+              <a:ext uri="{FF2B5EF4-FFF2-40B4-BE49-F238E27FC236}">
+                <a16:creationId xmlns:a16="http://schemas.microsoft.com/office/drawing/2014/main" id="{9761682D-EF20-4624-B146-A7F40B31A39B}"/>
+              </a:ext>
+            </a:extLst>
+          </p:cNvPr>
+          <p:cNvSpPr txBox="1"/>
+          <p:nvPr/>
+        </p:nvSpPr>
+        <p:spPr>
+          <a:xfrm>
+            <a:off x="138550" y="527646"/>
+            <a:ext cx="5191897" cy="1569660"/>
+          </a:xfrm>
+          <a:prstGeom prst="rect">
+            <a:avLst/>
+          </a:prstGeom>
+          <a:noFill/>
+        </p:spPr>
+        <p:txBody>
+          <a:bodyPr wrap="square" rtlCol="0">
+            <a:spAutoFit/>
+          </a:bodyPr>
+          <a:lstStyle/>
+          <a:p>
+            <a:r>
+              <a:rPr lang="en-US" sz="1600" dirty="0"/>
+              <a:t>AB, BC, CD and DA are linear functions. To fill the </a:t>
+            </a:r>
+            <a:r>
+              <a:rPr lang="en-US" sz="1600" dirty="0" err="1"/>
+              <a:t>rect</a:t>
+            </a:r>
+            <a:r>
+              <a:rPr lang="en-US" sz="1600" dirty="0"/>
+              <a:t> we start with the relative </a:t>
+            </a:r>
+            <a:r>
+              <a:rPr lang="en-US" sz="1600" dirty="0" err="1"/>
+              <a:t>y_pos</a:t>
+            </a:r>
+            <a:r>
+              <a:rPr lang="en-US" sz="1600" dirty="0"/>
+              <a:t> of C(always the lowest point and calculate with the linear functions the </a:t>
+            </a:r>
+            <a:r>
+              <a:rPr lang="en-US" sz="1600" dirty="0" err="1"/>
+              <a:t>x_pos</a:t>
+            </a:r>
+            <a:r>
+              <a:rPr lang="en-US" sz="1600" dirty="0"/>
+              <a:t> of every horizontal line and then draw this horizontal line from the </a:t>
+            </a:r>
+            <a:r>
+              <a:rPr lang="en-US" sz="1600" dirty="0" err="1"/>
+              <a:t>x_pos</a:t>
+            </a:r>
+            <a:r>
+              <a:rPr lang="en-US" sz="1600" dirty="0"/>
+              <a:t> of the </a:t>
+            </a:r>
+            <a:r>
+              <a:rPr lang="en-US" sz="1600" dirty="0" err="1"/>
+              <a:t>left_linear_function</a:t>
+            </a:r>
+            <a:r>
+              <a:rPr lang="en-US" sz="1600" dirty="0"/>
+              <a:t> to the </a:t>
+            </a:r>
+            <a:r>
+              <a:rPr lang="en-US" sz="1600" dirty="0" err="1"/>
+              <a:t>x_pos</a:t>
+            </a:r>
+            <a:r>
+              <a:rPr lang="en-US" sz="1600" dirty="0"/>
+              <a:t> of the </a:t>
+            </a:r>
+            <a:r>
+              <a:rPr lang="en-US" sz="1600" dirty="0" err="1"/>
+              <a:t>rigit_linear_function</a:t>
+            </a:r>
+            <a:endParaRPr lang="de-DE" sz="1600" dirty="0"/>
+          </a:p>
+        </p:txBody>
+      </p:sp>
+      <p:cxnSp>
+        <p:nvCxnSpPr>
+          <p:cNvPr id="10" name="Straight Connector 9">
+            <a:extLst>
+              <a:ext uri="{FF2B5EF4-FFF2-40B4-BE49-F238E27FC236}">
+                <a16:creationId xmlns:a16="http://schemas.microsoft.com/office/drawing/2014/main" id="{E9EFC951-B939-4C48-9AEF-B0EA87AB8C98}"/>
+              </a:ext>
+            </a:extLst>
+          </p:cNvPr>
+          <p:cNvCxnSpPr/>
+          <p:nvPr/>
+        </p:nvCxnSpPr>
+        <p:spPr>
+          <a:xfrm>
+            <a:off x="4292082" y="5458408"/>
+            <a:ext cx="174435" cy="0"/>
+          </a:xfrm>
+          <a:prstGeom prst="line">
+            <a:avLst/>
+          </a:prstGeom>
+          <a:ln w="76200">
+            <a:solidFill>
+              <a:srgbClr val="FFC000"/>
+            </a:solidFill>
+          </a:ln>
+        </p:spPr>
+        <p:style>
+          <a:lnRef idx="1">
+            <a:schemeClr val="accent1"/>
+          </a:lnRef>
+          <a:fillRef idx="0">
+            <a:schemeClr val="accent1"/>
+          </a:fillRef>
+          <a:effectRef idx="0">
+            <a:schemeClr val="accent1"/>
+          </a:effectRef>
+          <a:fontRef idx="minor">
+            <a:schemeClr val="tx1"/>
+          </a:fontRef>
+        </p:style>
+      </p:cxnSp>
+      <p:cxnSp>
+        <p:nvCxnSpPr>
+          <p:cNvPr id="41" name="Straight Connector 40">
+            <a:extLst>
+              <a:ext uri="{FF2B5EF4-FFF2-40B4-BE49-F238E27FC236}">
+                <a16:creationId xmlns:a16="http://schemas.microsoft.com/office/drawing/2014/main" id="{14F7EE0C-A499-48D8-89CB-59BFFC72706B}"/>
+              </a:ext>
+            </a:extLst>
+          </p:cNvPr>
+          <p:cNvCxnSpPr>
+            <a:cxnSpLocks/>
+          </p:cNvCxnSpPr>
+          <p:nvPr/>
+        </p:nvCxnSpPr>
+        <p:spPr>
+          <a:xfrm>
+            <a:off x="4208106" y="5355771"/>
+            <a:ext cx="643812" cy="0"/>
+          </a:xfrm>
+          <a:prstGeom prst="line">
+            <a:avLst/>
+          </a:prstGeom>
+          <a:ln w="76200">
+            <a:solidFill>
+              <a:srgbClr val="FFC000"/>
+            </a:solidFill>
+          </a:ln>
+        </p:spPr>
+        <p:style>
+          <a:lnRef idx="1">
+            <a:schemeClr val="accent1"/>
+          </a:lnRef>
+          <a:fillRef idx="0">
+            <a:schemeClr val="accent1"/>
+          </a:fillRef>
+          <a:effectRef idx="0">
+            <a:schemeClr val="accent1"/>
+          </a:effectRef>
+          <a:fontRef idx="minor">
+            <a:schemeClr val="tx1"/>
+          </a:fontRef>
+        </p:style>
+      </p:cxnSp>
+      <p:cxnSp>
+        <p:nvCxnSpPr>
+          <p:cNvPr id="43" name="Straight Connector 42">
+            <a:extLst>
+              <a:ext uri="{FF2B5EF4-FFF2-40B4-BE49-F238E27FC236}">
+                <a16:creationId xmlns:a16="http://schemas.microsoft.com/office/drawing/2014/main" id="{1719E980-2C23-4DE5-AAC6-6EF8A67210B1}"/>
+              </a:ext>
+            </a:extLst>
+          </p:cNvPr>
+          <p:cNvCxnSpPr>
+            <a:cxnSpLocks/>
+          </p:cNvCxnSpPr>
+          <p:nvPr/>
+        </p:nvCxnSpPr>
+        <p:spPr>
+          <a:xfrm>
+            <a:off x="4208106" y="5243803"/>
+            <a:ext cx="951723" cy="0"/>
+          </a:xfrm>
+          <a:prstGeom prst="line">
+            <a:avLst/>
+          </a:prstGeom>
+          <a:ln w="76200">
+            <a:solidFill>
+              <a:srgbClr val="FFC000"/>
+            </a:solidFill>
+          </a:ln>
+        </p:spPr>
+        <p:style>
+          <a:lnRef idx="1">
+            <a:schemeClr val="accent1"/>
+          </a:lnRef>
+          <a:fillRef idx="0">
+            <a:schemeClr val="accent1"/>
+          </a:fillRef>
+          <a:effectRef idx="0">
+            <a:schemeClr val="accent1"/>
+          </a:effectRef>
+          <a:fontRef idx="minor">
+            <a:schemeClr val="tx1"/>
+          </a:fontRef>
+        </p:style>
+      </p:cxnSp>
+      <p:cxnSp>
+        <p:nvCxnSpPr>
+          <p:cNvPr id="45" name="Straight Connector 44">
+            <a:extLst>
+              <a:ext uri="{FF2B5EF4-FFF2-40B4-BE49-F238E27FC236}">
+                <a16:creationId xmlns:a16="http://schemas.microsoft.com/office/drawing/2014/main" id="{47E3C53C-ADB6-4870-AF77-E94EFA610E63}"/>
+              </a:ext>
+            </a:extLst>
+          </p:cNvPr>
+          <p:cNvCxnSpPr>
+            <a:cxnSpLocks/>
+          </p:cNvCxnSpPr>
+          <p:nvPr/>
+        </p:nvCxnSpPr>
+        <p:spPr>
+          <a:xfrm>
+            <a:off x="4208106" y="5131836"/>
+            <a:ext cx="1355064" cy="0"/>
+          </a:xfrm>
+          <a:prstGeom prst="line">
+            <a:avLst/>
+          </a:prstGeom>
+          <a:ln w="76200">
+            <a:solidFill>
+              <a:srgbClr val="FFC000"/>
+            </a:solidFill>
+          </a:ln>
+        </p:spPr>
+        <p:style>
+          <a:lnRef idx="1">
+            <a:schemeClr val="accent1"/>
+          </a:lnRef>
+          <a:fillRef idx="0">
+            <a:schemeClr val="accent1"/>
+          </a:fillRef>
+          <a:effectRef idx="0">
+            <a:schemeClr val="accent1"/>
+          </a:effectRef>
+          <a:fontRef idx="minor">
+            <a:schemeClr val="tx1"/>
+          </a:fontRef>
+        </p:style>
+      </p:cxnSp>
+      <p:cxnSp>
+        <p:nvCxnSpPr>
+          <p:cNvPr id="47" name="Straight Connector 46">
+            <a:extLst>
+              <a:ext uri="{FF2B5EF4-FFF2-40B4-BE49-F238E27FC236}">
+                <a16:creationId xmlns:a16="http://schemas.microsoft.com/office/drawing/2014/main" id="{159F8CF5-F9D6-4726-9FE9-7A08BC7DDAEE}"/>
+              </a:ext>
+            </a:extLst>
+          </p:cNvPr>
+          <p:cNvCxnSpPr>
+            <a:cxnSpLocks/>
+          </p:cNvCxnSpPr>
+          <p:nvPr/>
+        </p:nvCxnSpPr>
+        <p:spPr>
+          <a:xfrm>
+            <a:off x="4174386" y="5012706"/>
+            <a:ext cx="1921614" cy="0"/>
+          </a:xfrm>
+          <a:prstGeom prst="line">
+            <a:avLst/>
+          </a:prstGeom>
+          <a:ln w="76200">
+            <a:solidFill>
+              <a:srgbClr val="FFC000"/>
+            </a:solidFill>
+          </a:ln>
+        </p:spPr>
+        <p:style>
+          <a:lnRef idx="1">
+            <a:schemeClr val="accent1"/>
+          </a:lnRef>
+          <a:fillRef idx="0">
+            <a:schemeClr val="accent1"/>
+          </a:fillRef>
+          <a:effectRef idx="0">
+            <a:schemeClr val="accent1"/>
+          </a:effectRef>
+          <a:fontRef idx="minor">
+            <a:schemeClr val="tx1"/>
+          </a:fontRef>
+        </p:style>
+      </p:cxnSp>
+      <p:sp>
+        <p:nvSpPr>
+          <p:cNvPr id="22" name="TextBox 21">
+            <a:extLst>
+              <a:ext uri="{FF2B5EF4-FFF2-40B4-BE49-F238E27FC236}">
+                <a16:creationId xmlns:a16="http://schemas.microsoft.com/office/drawing/2014/main" id="{67ED4E59-E9FA-473C-82A6-67497BF62821}"/>
+              </a:ext>
+            </a:extLst>
+          </p:cNvPr>
+          <p:cNvSpPr txBox="1"/>
+          <p:nvPr/>
+        </p:nvSpPr>
+        <p:spPr>
+          <a:xfrm>
+            <a:off x="9098004" y="118137"/>
+            <a:ext cx="3100847" cy="1815882"/>
+          </a:xfrm>
+          <a:prstGeom prst="rect">
+            <a:avLst/>
+          </a:prstGeom>
+          <a:noFill/>
+        </p:spPr>
+        <p:txBody>
+          <a:bodyPr wrap="square" rtlCol="0">
+            <a:spAutoFit/>
+          </a:bodyPr>
+          <a:lstStyle/>
+          <a:p>
+            <a:r>
+              <a:rPr lang="en-US" sz="1600" dirty="0"/>
+              <a:t>We change the left linear function(from CD to DA) if the </a:t>
+            </a:r>
+            <a:r>
+              <a:rPr lang="en-US" sz="1600" dirty="0" err="1"/>
+              <a:t>y_pos</a:t>
+            </a:r>
+            <a:r>
+              <a:rPr lang="en-US" sz="1600" dirty="0"/>
+              <a:t> passes the </a:t>
+            </a:r>
+            <a:r>
+              <a:rPr lang="en-US" sz="1600" dirty="0" err="1"/>
+              <a:t>y_pos</a:t>
+            </a:r>
+            <a:r>
+              <a:rPr lang="en-US" sz="1600" dirty="0"/>
+              <a:t> of point D-</a:t>
+            </a:r>
+          </a:p>
+          <a:p>
+            <a:endParaRPr lang="en-US" sz="1600" dirty="0"/>
+          </a:p>
+          <a:p>
+            <a:r>
+              <a:rPr lang="en-US" sz="1600" dirty="0"/>
+              <a:t>And the same on the right side – we change(from CB to BA if the </a:t>
+            </a:r>
+            <a:r>
+              <a:rPr lang="en-US" sz="1600" dirty="0" err="1"/>
+              <a:t>y_pos</a:t>
+            </a:r>
+            <a:r>
+              <a:rPr lang="en-US" sz="1600" dirty="0"/>
+              <a:t> passes the </a:t>
+            </a:r>
+            <a:r>
+              <a:rPr lang="en-US" sz="1600" dirty="0" err="1"/>
+              <a:t>y_pos</a:t>
+            </a:r>
+            <a:r>
+              <a:rPr lang="en-US" sz="1600" dirty="0"/>
+              <a:t> of point B</a:t>
+            </a:r>
+            <a:endParaRPr lang="de-DE" sz="1600" dirty="0"/>
+          </a:p>
+        </p:txBody>
+      </p:sp>
     </p:spTree>
     <p:extLst>
       <p:ext uri="{BB962C8B-B14F-4D97-AF65-F5344CB8AC3E}">
-        <p14:creationId xmlns:p14="http://schemas.microsoft.com/office/powerpoint/2010/main" val="1060738270"/>
+        <p14:creationId xmlns:p14="http://schemas.microsoft.com/office/powerpoint/2010/main" val="2184592755"/>
       </p:ext>
     </p:extLst>
   </p:cSld>

</xml_diff>

<commit_message>
some fixes with input_field and checkbox and focus
</commit_message>
<xml_diff>
--- a/doc/turned rectangle/rotated_rect.pptx
+++ b/doc/turned rectangle/rotated_rect.pptx
@@ -265,7 +265,7 @@
           <a:p>
             <a:fld id="{D7B99F52-B9BD-4E0D-B849-E5B97405326F}" type="datetimeFigureOut">
               <a:rPr lang="de-DE" smtClean="0"/>
-              <a:t>31.07.2022</a:t>
+              <a:t>05.08.2022</a:t>
             </a:fld>
             <a:endParaRPr lang="de-DE"/>
           </a:p>
@@ -465,7 +465,7 @@
           <a:p>
             <a:fld id="{D7B99F52-B9BD-4E0D-B849-E5B97405326F}" type="datetimeFigureOut">
               <a:rPr lang="de-DE" smtClean="0"/>
-              <a:t>31.07.2022</a:t>
+              <a:t>05.08.2022</a:t>
             </a:fld>
             <a:endParaRPr lang="de-DE"/>
           </a:p>
@@ -675,7 +675,7 @@
           <a:p>
             <a:fld id="{D7B99F52-B9BD-4E0D-B849-E5B97405326F}" type="datetimeFigureOut">
               <a:rPr lang="de-DE" smtClean="0"/>
-              <a:t>31.07.2022</a:t>
+              <a:t>05.08.2022</a:t>
             </a:fld>
             <a:endParaRPr lang="de-DE"/>
           </a:p>
@@ -875,7 +875,7 @@
           <a:p>
             <a:fld id="{D7B99F52-B9BD-4E0D-B849-E5B97405326F}" type="datetimeFigureOut">
               <a:rPr lang="de-DE" smtClean="0"/>
-              <a:t>31.07.2022</a:t>
+              <a:t>05.08.2022</a:t>
             </a:fld>
             <a:endParaRPr lang="de-DE"/>
           </a:p>
@@ -1151,7 +1151,7 @@
           <a:p>
             <a:fld id="{D7B99F52-B9BD-4E0D-B849-E5B97405326F}" type="datetimeFigureOut">
               <a:rPr lang="de-DE" smtClean="0"/>
-              <a:t>31.07.2022</a:t>
+              <a:t>05.08.2022</a:t>
             </a:fld>
             <a:endParaRPr lang="de-DE"/>
           </a:p>
@@ -1419,7 +1419,7 @@
           <a:p>
             <a:fld id="{D7B99F52-B9BD-4E0D-B849-E5B97405326F}" type="datetimeFigureOut">
               <a:rPr lang="de-DE" smtClean="0"/>
-              <a:t>31.07.2022</a:t>
+              <a:t>05.08.2022</a:t>
             </a:fld>
             <a:endParaRPr lang="de-DE"/>
           </a:p>
@@ -1834,7 +1834,7 @@
           <a:p>
             <a:fld id="{D7B99F52-B9BD-4E0D-B849-E5B97405326F}" type="datetimeFigureOut">
               <a:rPr lang="de-DE" smtClean="0"/>
-              <a:t>31.07.2022</a:t>
+              <a:t>05.08.2022</a:t>
             </a:fld>
             <a:endParaRPr lang="de-DE"/>
           </a:p>
@@ -1976,7 +1976,7 @@
           <a:p>
             <a:fld id="{D7B99F52-B9BD-4E0D-B849-E5B97405326F}" type="datetimeFigureOut">
               <a:rPr lang="de-DE" smtClean="0"/>
-              <a:t>31.07.2022</a:t>
+              <a:t>05.08.2022</a:t>
             </a:fld>
             <a:endParaRPr lang="de-DE"/>
           </a:p>
@@ -2089,7 +2089,7 @@
           <a:p>
             <a:fld id="{D7B99F52-B9BD-4E0D-B849-E5B97405326F}" type="datetimeFigureOut">
               <a:rPr lang="de-DE" smtClean="0"/>
-              <a:t>31.07.2022</a:t>
+              <a:t>05.08.2022</a:t>
             </a:fld>
             <a:endParaRPr lang="de-DE"/>
           </a:p>
@@ -2402,7 +2402,7 @@
           <a:p>
             <a:fld id="{D7B99F52-B9BD-4E0D-B849-E5B97405326F}" type="datetimeFigureOut">
               <a:rPr lang="de-DE" smtClean="0"/>
-              <a:t>31.07.2022</a:t>
+              <a:t>05.08.2022</a:t>
             </a:fld>
             <a:endParaRPr lang="de-DE"/>
           </a:p>
@@ -2691,7 +2691,7 @@
           <a:p>
             <a:fld id="{D7B99F52-B9BD-4E0D-B849-E5B97405326F}" type="datetimeFigureOut">
               <a:rPr lang="de-DE" smtClean="0"/>
-              <a:t>31.07.2022</a:t>
+              <a:t>05.08.2022</a:t>
             </a:fld>
             <a:endParaRPr lang="de-DE"/>
           </a:p>
@@ -2934,7 +2934,7 @@
           <a:p>
             <a:fld id="{D7B99F52-B9BD-4E0D-B849-E5B97405326F}" type="datetimeFigureOut">
               <a:rPr lang="de-DE" smtClean="0"/>
-              <a:t>31.07.2022</a:t>
+              <a:t>05.08.2022</a:t>
             </a:fld>
             <a:endParaRPr lang="de-DE"/>
           </a:p>
@@ -4706,8 +4706,8 @@
             </a:p>
           </p:txBody>
         </p:sp>
-        <mc:AlternateContent xmlns:mc="http://schemas.openxmlformats.org/markup-compatibility/2006">
-          <mc:Choice xmlns:a14="http://schemas.microsoft.com/office/drawing/2010/main" Requires="a14">
+        <mc:AlternateContent xmlns:mc="http://schemas.openxmlformats.org/markup-compatibility/2006" xmlns:a14="http://schemas.microsoft.com/office/drawing/2010/main">
+          <mc:Choice Requires="a14">
             <p:sp>
               <p:nvSpPr>
                 <p:cNvPr id="29" name="TextBox 28">
@@ -4757,7 +4757,7 @@
               </p:txBody>
             </p:sp>
           </mc:Choice>
-          <mc:Fallback>
+          <mc:Fallback xmlns="">
             <p:sp>
               <p:nvSpPr>
                 <p:cNvPr id="29" name="TextBox 28">
@@ -4854,8 +4854,8 @@
             </a:p>
           </p:txBody>
         </p:sp>
-        <mc:AlternateContent xmlns:mc="http://schemas.openxmlformats.org/markup-compatibility/2006">
-          <mc:Choice xmlns:a14="http://schemas.microsoft.com/office/drawing/2010/main" Requires="a14">
+        <mc:AlternateContent xmlns:mc="http://schemas.openxmlformats.org/markup-compatibility/2006" xmlns:a14="http://schemas.microsoft.com/office/drawing/2010/main">
+          <mc:Choice Requires="a14">
             <p:sp>
               <p:nvSpPr>
                 <p:cNvPr id="31" name="TextBox 30">
@@ -4905,7 +4905,7 @@
               </p:txBody>
             </p:sp>
           </mc:Choice>
-          <mc:Fallback>
+          <mc:Fallback xmlns="">
             <p:sp>
               <p:nvSpPr>
                 <p:cNvPr id="31" name="TextBox 30">
@@ -9684,7 +9684,6 @@
             </a:bodyPr>
             <a:lstStyle/>
             <a:p>
-              <a:pPr/>
               <a:endParaRPr lang="de-DE" sz="1600" dirty="0"/>
             </a:p>
           </p:txBody>
@@ -9717,7 +9716,6 @@
             </a:bodyPr>
             <a:lstStyle/>
             <a:p>
-              <a:pPr/>
               <a:endParaRPr lang="de-DE" sz="1600" dirty="0"/>
             </a:p>
           </p:txBody>

</xml_diff>